<commit_message>
Some additional polish of the 3rd lecture.
</commit_message>
<xml_diff>
--- a/Session_03_Probabilistic_programming/Probabilistic_programming.pptx
+++ b/Session_03_Probabilistic_programming/Probabilistic_programming.pptx
@@ -5,7 +5,7 @@
     <p:sldMasterId id="2147483660" r:id="rId1"/>
   </p:sldMasterIdLst>
   <p:notesMasterIdLst>
-    <p:notesMasterId r:id="rId38"/>
+    <p:notesMasterId r:id="rId36"/>
   </p:notesMasterIdLst>
   <p:sldIdLst>
     <p:sldId id="295" r:id="rId2"/>
@@ -32,18 +32,16 @@
     <p:sldId id="317" r:id="rId23"/>
     <p:sldId id="318" r:id="rId24"/>
     <p:sldId id="319" r:id="rId25"/>
-    <p:sldId id="320" r:id="rId26"/>
-    <p:sldId id="321" r:id="rId27"/>
-    <p:sldId id="322" r:id="rId28"/>
-    <p:sldId id="323" r:id="rId29"/>
-    <p:sldId id="324" r:id="rId30"/>
-    <p:sldId id="325" r:id="rId31"/>
-    <p:sldId id="326" r:id="rId32"/>
-    <p:sldId id="327" r:id="rId33"/>
-    <p:sldId id="328" r:id="rId34"/>
-    <p:sldId id="329" r:id="rId35"/>
-    <p:sldId id="330" r:id="rId36"/>
-    <p:sldId id="331" r:id="rId37"/>
+    <p:sldId id="322" r:id="rId26"/>
+    <p:sldId id="323" r:id="rId27"/>
+    <p:sldId id="324" r:id="rId28"/>
+    <p:sldId id="325" r:id="rId29"/>
+    <p:sldId id="326" r:id="rId30"/>
+    <p:sldId id="327" r:id="rId31"/>
+    <p:sldId id="328" r:id="rId32"/>
+    <p:sldId id="329" r:id="rId33"/>
+    <p:sldId id="330" r:id="rId34"/>
+    <p:sldId id="331" r:id="rId35"/>
   </p:sldIdLst>
   <p:sldSz cx="9144000" cy="5715000" type="screen16x10"/>
   <p:notesSz cx="6858000" cy="9144000"/>
@@ -2264,7 +2262,7 @@
           <a:p>
             <a:fld id="{445B5041-6ABE-482D-8014-87CF18E72B1E}" type="slidenum">
               <a:rPr lang="LID4096" smtClean="0"/>
-              <a:t>32</a:t>
+              <a:t>30</a:t>
             </a:fld>
             <a:endParaRPr lang="LID4096"/>
           </a:p>
@@ -2348,7 +2346,7 @@
           <a:p>
             <a:fld id="{445B5041-6ABE-482D-8014-87CF18E72B1E}" type="slidenum">
               <a:rPr lang="LID4096" smtClean="0"/>
-              <a:t>33</a:t>
+              <a:t>31</a:t>
             </a:fld>
             <a:endParaRPr lang="LID4096"/>
           </a:p>
@@ -2432,7 +2430,7 @@
           <a:p>
             <a:fld id="{445B5041-6ABE-482D-8014-87CF18E72B1E}" type="slidenum">
               <a:rPr lang="LID4096" smtClean="0"/>
-              <a:t>34</a:t>
+              <a:t>32</a:t>
             </a:fld>
             <a:endParaRPr lang="LID4096"/>
           </a:p>
@@ -2516,7 +2514,7 @@
           <a:p>
             <a:fld id="{445B5041-6ABE-482D-8014-87CF18E72B1E}" type="slidenum">
               <a:rPr lang="LID4096" smtClean="0"/>
-              <a:t>35</a:t>
+              <a:t>33</a:t>
             </a:fld>
             <a:endParaRPr lang="LID4096"/>
           </a:p>
@@ -2605,7 +2603,7 @@
           <a:p>
             <a:fld id="{445B5041-6ABE-482D-8014-87CF18E72B1E}" type="slidenum">
               <a:rPr lang="LID4096" smtClean="0"/>
-              <a:t>36</a:t>
+              <a:t>34</a:t>
             </a:fld>
             <a:endParaRPr lang="LID4096"/>
           </a:p>
@@ -5722,7 +5720,7 @@
           <a:graphicData uri="http://schemas.openxmlformats.org/presentationml/2006/ole">
             <mc:AlternateContent xmlns:mc="http://schemas.openxmlformats.org/markup-compatibility/2006">
               <mc:Choice xmlns:v="urn:schemas-microsoft-com:vml" Requires="v">
-                <p:oleObj spid="_x0000_s1028" r:id="rId3" imgW="6984000" imgH="6323760" progId="">
+                <p:oleObj spid="_x0000_s1034" r:id="rId3" imgW="6984000" imgH="6323760" progId="">
                   <p:embed/>
                 </p:oleObj>
               </mc:Choice>
@@ -5791,7 +5789,7 @@
           <a:graphicData uri="http://schemas.openxmlformats.org/presentationml/2006/ole">
             <mc:AlternateContent xmlns:mc="http://schemas.openxmlformats.org/markup-compatibility/2006">
               <mc:Choice xmlns:v="urn:schemas-microsoft-com:vml" Requires="v">
-                <p:oleObj spid="_x0000_s1029" r:id="rId5" imgW="6984000" imgH="6323760" progId="">
+                <p:oleObj spid="_x0000_s1035" r:id="rId5" imgW="6984000" imgH="6323760" progId="">
                   <p:embed/>
                 </p:oleObj>
               </mc:Choice>
@@ -6014,7 +6012,7 @@
                 <a:latin typeface="Source Sans Pro Light" panose="020B0403030403020204" pitchFamily="34" charset="0"/>
                 <a:ea typeface="Source Sans Pro Light" panose="020B0403030403020204" pitchFamily="34" charset="0"/>
               </a:rPr>
-              <a:t>Pairs well with many popular programming languages (e.g. R, python ...). </a:t>
+              <a:t>Pairs well with many popular programming languages (e.g., R, python ...). </a:t>
             </a:r>
           </a:p>
           <a:p>
@@ -6713,20 +6711,34 @@
                 <a:latin typeface="Consolas" panose="020B0609020204030204" pitchFamily="49" charset="0"/>
                 <a:ea typeface="Source Sans Pro Light" panose="020B0403030403020204" pitchFamily="34" charset="0"/>
               </a:rPr>
-              <a:t>// </a:t>
-            </a:r>
-            <a:r>
-              <a:rPr lang="en-US" sz="1600" dirty="0" err="1">
-                <a:solidFill>
-                  <a:schemeClr val="bg1">
-                    <a:lumMod val="65000"/>
-                  </a:schemeClr>
-                </a:solidFill>
-                <a:latin typeface="Consolas" panose="020B0609020204030204" pitchFamily="49" charset="0"/>
-                <a:ea typeface="Source Sans Pro Light" panose="020B0403030403020204" pitchFamily="34" charset="0"/>
-              </a:rPr>
-              <a:t>computationly</a:t>
-            </a:r>
+              <a:t>// computationally vectors are more efficient than arrays</a:t>
+            </a:r>
+          </a:p>
+          <a:p>
+            <a:pPr marL="0" indent="0">
+              <a:buNone/>
+            </a:pPr>
+            <a:r>
+              <a:rPr lang="en-US" sz="1600" dirty="0">
+                <a:latin typeface="Consolas" panose="020B0609020204030204" pitchFamily="49" charset="0"/>
+                <a:ea typeface="Source Sans Pro Light" panose="020B0403030403020204" pitchFamily="34" charset="0"/>
+              </a:rPr>
+              <a:t>vector[n] v;</a:t>
+            </a:r>
+          </a:p>
+          <a:p>
+            <a:pPr marL="0" indent="0">
+              <a:buNone/>
+            </a:pPr>
+            <a:endParaRPr lang="en-US" sz="1600" dirty="0">
+              <a:latin typeface="Consolas" panose="020B0609020204030204" pitchFamily="49" charset="0"/>
+              <a:ea typeface="Source Sans Pro Light" panose="020B0403030403020204" pitchFamily="34" charset="0"/>
+            </a:endParaRPr>
+          </a:p>
+          <a:p>
+            <a:pPr marL="0" indent="0">
+              <a:buNone/>
+            </a:pPr>
             <a:r>
               <a:rPr lang="en-US" sz="1600" dirty="0">
                 <a:solidFill>
@@ -6737,29 +6749,8 @@
                 <a:latin typeface="Consolas" panose="020B0609020204030204" pitchFamily="49" charset="0"/>
                 <a:ea typeface="Source Sans Pro Light" panose="020B0403030403020204" pitchFamily="34" charset="0"/>
               </a:rPr>
-              <a:t> vectors are more efficient then arrays</a:t>
-            </a:r>
-          </a:p>
-          <a:p>
-            <a:pPr marL="0" indent="0">
-              <a:buNone/>
-            </a:pPr>
-            <a:r>
-              <a:rPr lang="en-US" sz="1600" dirty="0">
-                <a:latin typeface="Consolas" panose="020B0609020204030204" pitchFamily="49" charset="0"/>
-                <a:ea typeface="Source Sans Pro Light" panose="020B0403030403020204" pitchFamily="34" charset="0"/>
-              </a:rPr>
-              <a:t>vector[n] v;</a:t>
-            </a:r>
-          </a:p>
-          <a:p>
-            <a:pPr marL="0" indent="0">
-              <a:buNone/>
-            </a:pPr>
-            <a:endParaRPr lang="en-US" sz="1600" dirty="0">
-              <a:latin typeface="Consolas" panose="020B0609020204030204" pitchFamily="49" charset="0"/>
-              <a:ea typeface="Source Sans Pro Light" panose="020B0403030403020204" pitchFamily="34" charset="0"/>
-            </a:endParaRPr>
+              <a:t>// matrix (real number)</a:t>
+            </a:r>
           </a:p>
           <a:p>
             <a:pPr marL="0" indent="0">
@@ -6775,24 +6766,7 @@
                 <a:latin typeface="Consolas" panose="020B0609020204030204" pitchFamily="49" charset="0"/>
                 <a:ea typeface="Source Sans Pro Light" panose="020B0403030403020204" pitchFamily="34" charset="0"/>
               </a:rPr>
-              <a:t>// matrix (real number)</a:t>
-            </a:r>
-          </a:p>
-          <a:p>
-            <a:pPr marL="0" indent="0">
-              <a:buNone/>
-            </a:pPr>
-            <a:r>
-              <a:rPr lang="en-US" sz="1600" dirty="0">
-                <a:solidFill>
-                  <a:schemeClr val="bg1">
-                    <a:lumMod val="65000"/>
-                  </a:schemeClr>
-                </a:solidFill>
-                <a:latin typeface="Consolas" panose="020B0609020204030204" pitchFamily="49" charset="0"/>
-                <a:ea typeface="Source Sans Pro Light" panose="020B0403030403020204" pitchFamily="34" charset="0"/>
-              </a:rPr>
-              <a:t>// just like vectors, matrices are more efficient then arrays</a:t>
+              <a:t>// just like vectors, matrices are more efficient than arrays</a:t>
             </a:r>
           </a:p>
           <a:p>
@@ -10854,7 +10828,7 @@
         </p:blipFill>
         <p:spPr>
           <a:xfrm>
-            <a:off x="2030642" y="309365"/>
+            <a:off x="2030642" y="314459"/>
             <a:ext cx="5082715" cy="5096270"/>
           </a:xfrm>
           <a:prstGeom prst="rect">
@@ -10890,7 +10864,7 @@
                 <a:latin typeface="Source Sans Pro" panose="020B0503030403020204" pitchFamily="34" charset="0"/>
                 <a:ea typeface="Source Sans Pro" panose="020B0503030403020204" pitchFamily="34" charset="0"/>
               </a:rPr>
-              <a:t>“Foreach” loops</a:t>
+              <a:t>While statements, break and continue</a:t>
             </a:r>
             <a:endParaRPr lang="LID4096" sz="2800" b="1" dirty="0">
               <a:latin typeface="Source Sans Pro" panose="020B0503030403020204" pitchFamily="34" charset="0"/>
@@ -10975,15 +10949,10 @@
             </a:pPr>
             <a:r>
               <a:rPr lang="en-US" sz="1600" dirty="0">
-                <a:solidFill>
-                  <a:schemeClr val="bg1">
-                    <a:lumMod val="65000"/>
-                  </a:schemeClr>
-                </a:solidFill>
-                <a:latin typeface="Consolas" panose="020B0609020204030204" pitchFamily="49" charset="0"/>
-                <a:ea typeface="Source Sans Pro Light" panose="020B0403030403020204" pitchFamily="34" charset="0"/>
-              </a:rPr>
-              <a:t>// if items is a container (vector, row vector, matrix, or array)</a:t>
+                <a:latin typeface="Consolas" panose="020B0609020204030204" pitchFamily="49" charset="0"/>
+                <a:ea typeface="Source Sans Pro Light" panose="020B0403030403020204" pitchFamily="34" charset="0"/>
+              </a:rPr>
+              <a:t>while (condition) {</a:t>
             </a:r>
           </a:p>
           <a:p>
@@ -10995,74 +10964,20 @@
                 <a:latin typeface="Consolas" panose="020B0609020204030204" pitchFamily="49" charset="0"/>
                 <a:ea typeface="Source Sans Pro Light" panose="020B0403030403020204" pitchFamily="34" charset="0"/>
               </a:rPr>
-              <a:t>for (</a:t>
-            </a:r>
-            <a:r>
-              <a:rPr lang="en-US" sz="1600" dirty="0" err="1">
-                <a:latin typeface="Consolas" panose="020B0609020204030204" pitchFamily="49" charset="0"/>
-                <a:ea typeface="Source Sans Pro Light" panose="020B0403030403020204" pitchFamily="34" charset="0"/>
-              </a:rPr>
-              <a:t>i</a:t>
-            </a:r>
+              <a:t>  if (x[n] &gt;= 0) continue;</a:t>
+            </a:r>
+          </a:p>
+          <a:p>
+            <a:pPr marL="0" indent="0">
+              <a:buNone/>
+            </a:pPr>
             <a:r>
               <a:rPr lang="en-US" sz="1600" dirty="0">
                 <a:latin typeface="Consolas" panose="020B0609020204030204" pitchFamily="49" charset="0"/>
                 <a:ea typeface="Source Sans Pro Light" panose="020B0403030403020204" pitchFamily="34" charset="0"/>
               </a:rPr>
-              <a:t> in items) {</a:t>
-            </a:r>
-          </a:p>
-          <a:p>
-            <a:pPr marL="0" indent="0">
-              <a:buNone/>
-            </a:pPr>
-            <a:r>
-              <a:rPr lang="en-US" sz="1600" dirty="0">
-                <a:latin typeface="Consolas" panose="020B0609020204030204" pitchFamily="49" charset="0"/>
-                <a:ea typeface="Source Sans Pro Light" panose="020B0403030403020204" pitchFamily="34" charset="0"/>
-              </a:rPr>
-              <a:t>  ... do something with </a:t>
-            </a:r>
-            <a:r>
-              <a:rPr lang="en-US" sz="1600" dirty="0" err="1">
-                <a:latin typeface="Consolas" panose="020B0609020204030204" pitchFamily="49" charset="0"/>
-                <a:ea typeface="Source Sans Pro Light" panose="020B0403030403020204" pitchFamily="34" charset="0"/>
-              </a:rPr>
-              <a:t>i</a:t>
-            </a:r>
-            <a:r>
-              <a:rPr lang="en-US" sz="1600" dirty="0">
-                <a:latin typeface="Consolas" panose="020B0609020204030204" pitchFamily="49" charset="0"/>
-                <a:ea typeface="Source Sans Pro Light" panose="020B0403030403020204" pitchFamily="34" charset="0"/>
-              </a:rPr>
-              <a:t> ...</a:t>
-            </a:r>
-          </a:p>
-          <a:p>
-            <a:pPr marL="0" indent="0">
-              <a:buNone/>
-            </a:pPr>
-            <a:r>
-              <a:rPr lang="en-US" sz="1600" dirty="0">
-                <a:latin typeface="Consolas" panose="020B0609020204030204" pitchFamily="49" charset="0"/>
-                <a:ea typeface="Source Sans Pro Light" panose="020B0403030403020204" pitchFamily="34" charset="0"/>
-              </a:rPr>
-              <a:t>}</a:t>
-            </a:r>
-          </a:p>
-          <a:p>
-            <a:pPr marL="0" indent="0">
-              <a:buNone/>
-            </a:pPr>
-            <a:endParaRPr lang="en-US" sz="1600" dirty="0">
-              <a:latin typeface="Consolas" panose="020B0609020204030204" pitchFamily="49" charset="0"/>
-              <a:ea typeface="Source Sans Pro Light" panose="020B0403030403020204" pitchFamily="34" charset="0"/>
-            </a:endParaRPr>
-          </a:p>
-          <a:p>
-            <a:pPr marL="0" indent="0">
-              <a:buNone/>
-            </a:pPr>
+              <a:t>  </a:t>
+            </a:r>
             <a:r>
               <a:rPr lang="en-US" sz="1600" dirty="0">
                 <a:solidFill>
@@ -11073,19 +10988,80 @@
                 <a:latin typeface="Consolas" panose="020B0609020204030204" pitchFamily="49" charset="0"/>
                 <a:ea typeface="Source Sans Pro Light" panose="020B0403030403020204" pitchFamily="34" charset="0"/>
               </a:rPr>
-              <a:t>// for </a:t>
-            </a:r>
-            <a:r>
-              <a:rPr lang="en-US" sz="1600" dirty="0" err="1">
-                <a:solidFill>
-                  <a:schemeClr val="bg1">
-                    <a:lumMod val="65000"/>
-                  </a:schemeClr>
-                </a:solidFill>
-                <a:latin typeface="Consolas" panose="020B0609020204030204" pitchFamily="49" charset="0"/>
-                <a:ea typeface="Source Sans Pro Light" panose="020B0403030403020204" pitchFamily="34" charset="0"/>
-              </a:rPr>
-              <a:t>2D</a:t>
+              <a:t>// if above holds the line below will be skipped due to continue</a:t>
+            </a:r>
+            <a:endParaRPr lang="en-US" sz="1600" dirty="0">
+              <a:latin typeface="Consolas" panose="020B0609020204030204" pitchFamily="49" charset="0"/>
+              <a:ea typeface="Source Sans Pro Light" panose="020B0403030403020204" pitchFamily="34" charset="0"/>
+            </a:endParaRPr>
+          </a:p>
+          <a:p>
+            <a:pPr marL="0" indent="0">
+              <a:buNone/>
+            </a:pPr>
+            <a:r>
+              <a:rPr lang="en-US" sz="1600" dirty="0">
+                <a:latin typeface="Consolas" panose="020B0609020204030204" pitchFamily="49" charset="0"/>
+                <a:ea typeface="Source Sans Pro Light" panose="020B0403030403020204" pitchFamily="34" charset="0"/>
+              </a:rPr>
+              <a:t>  sum += x[n];</a:t>
+            </a:r>
+          </a:p>
+          <a:p>
+            <a:pPr marL="0" indent="0">
+              <a:buNone/>
+            </a:pPr>
+            <a:r>
+              <a:rPr lang="en-US" sz="1600" dirty="0">
+                <a:latin typeface="Consolas" panose="020B0609020204030204" pitchFamily="49" charset="0"/>
+                <a:ea typeface="Source Sans Pro Light" panose="020B0403030403020204" pitchFamily="34" charset="0"/>
+              </a:rPr>
+              <a:t>}</a:t>
+            </a:r>
+          </a:p>
+          <a:p>
+            <a:pPr marL="0" indent="0">
+              <a:buNone/>
+            </a:pPr>
+            <a:endParaRPr lang="en-US" sz="1600" dirty="0">
+              <a:latin typeface="Consolas" panose="020B0609020204030204" pitchFamily="49" charset="0"/>
+              <a:ea typeface="Source Sans Pro Light" panose="020B0403030403020204" pitchFamily="34" charset="0"/>
+            </a:endParaRPr>
+          </a:p>
+          <a:p>
+            <a:pPr marL="0" indent="0">
+              <a:buNone/>
+            </a:pPr>
+            <a:r>
+              <a:rPr lang="en-US" sz="1600" dirty="0">
+                <a:latin typeface="Consolas" panose="020B0609020204030204" pitchFamily="49" charset="0"/>
+                <a:ea typeface="Source Sans Pro Light" panose="020B0403030403020204" pitchFamily="34" charset="0"/>
+              </a:rPr>
+              <a:t>while (condition) {</a:t>
+            </a:r>
+          </a:p>
+          <a:p>
+            <a:pPr marL="0" indent="0">
+              <a:buNone/>
+            </a:pPr>
+            <a:r>
+              <a:rPr lang="en-US" sz="1600" dirty="0">
+                <a:latin typeface="Consolas" panose="020B0609020204030204" pitchFamily="49" charset="0"/>
+                <a:ea typeface="Source Sans Pro Light" panose="020B0403030403020204" pitchFamily="34" charset="0"/>
+              </a:rPr>
+              <a:t>  if (x[n] &gt;= 0) break;</a:t>
+            </a:r>
+          </a:p>
+          <a:p>
+            <a:pPr marL="0" indent="0">
+              <a:buNone/>
+            </a:pPr>
+            <a:r>
+              <a:rPr lang="en-US" sz="1600" dirty="0">
+                <a:latin typeface="Consolas" panose="020B0609020204030204" pitchFamily="49" charset="0"/>
+                <a:ea typeface="Source Sans Pro Light" panose="020B0403030403020204" pitchFamily="34" charset="0"/>
+              </a:rPr>
+              <a:t>  </a:t>
             </a:r>
             <a:r>
               <a:rPr lang="en-US" sz="1600" dirty="0">
@@ -11097,8 +11073,12 @@
                 <a:latin typeface="Consolas" panose="020B0609020204030204" pitchFamily="49" charset="0"/>
                 <a:ea typeface="Source Sans Pro Light" panose="020B0403030403020204" pitchFamily="34" charset="0"/>
               </a:rPr>
-              <a:t> arrays we require a double loop</a:t>
-            </a:r>
+              <a:t>// if above is true, while loop will exit</a:t>
+            </a:r>
+            <a:endParaRPr lang="en-US" sz="1600" dirty="0">
+              <a:latin typeface="Consolas" panose="020B0609020204030204" pitchFamily="49" charset="0"/>
+              <a:ea typeface="Source Sans Pro Light" panose="020B0403030403020204" pitchFamily="34" charset="0"/>
+            </a:endParaRPr>
           </a:p>
           <a:p>
             <a:pPr marL="0" indent="0">
@@ -11106,15 +11086,10 @@
             </a:pPr>
             <a:r>
               <a:rPr lang="en-US" sz="1600" dirty="0">
-                <a:solidFill>
-                  <a:schemeClr val="bg1">
-                    <a:lumMod val="65000"/>
-                  </a:schemeClr>
-                </a:solidFill>
-                <a:latin typeface="Consolas" panose="020B0609020204030204" pitchFamily="49" charset="0"/>
-                <a:ea typeface="Source Sans Pro Light" panose="020B0403030403020204" pitchFamily="34" charset="0"/>
-              </a:rPr>
-              <a:t>// we can traverse matrices in a single “foreach” loop</a:t>
+                <a:latin typeface="Consolas" panose="020B0609020204030204" pitchFamily="49" charset="0"/>
+                <a:ea typeface="Source Sans Pro Light" panose="020B0403030403020204" pitchFamily="34" charset="0"/>
+              </a:rPr>
+              <a:t>  sum += x[n];</a:t>
             </a:r>
           </a:p>
           <a:p>
@@ -11123,91 +11098,10 @@
             </a:pPr>
             <a:r>
               <a:rPr lang="en-US" sz="1600" dirty="0">
-                <a:solidFill>
-                  <a:schemeClr val="bg1">
-                    <a:lumMod val="65000"/>
-                  </a:schemeClr>
-                </a:solidFill>
-                <a:latin typeface="Consolas" panose="020B0609020204030204" pitchFamily="49" charset="0"/>
-                <a:ea typeface="Source Sans Pro Light" panose="020B0403030403020204" pitchFamily="34" charset="0"/>
-              </a:rPr>
-              <a:t>// elements in a matrix are visited in a column-major order</a:t>
-            </a:r>
-          </a:p>
-          <a:p>
-            <a:pPr marL="0" indent="0">
-              <a:buNone/>
-            </a:pPr>
-            <a:r>
-              <a:rPr lang="en-US" sz="1600" dirty="0">
-                <a:latin typeface="Consolas" panose="020B0609020204030204" pitchFamily="49" charset="0"/>
-                <a:ea typeface="Source Sans Pro Light" panose="020B0403030403020204" pitchFamily="34" charset="0"/>
-              </a:rPr>
-              <a:t>real array[2, 3];</a:t>
-            </a:r>
-          </a:p>
-          <a:p>
-            <a:pPr marL="0" indent="0">
-              <a:buNone/>
-            </a:pPr>
-            <a:r>
-              <a:rPr lang="en-US" sz="1600" dirty="0">
-                <a:latin typeface="Consolas" panose="020B0609020204030204" pitchFamily="49" charset="0"/>
-                <a:ea typeface="Source Sans Pro Light" panose="020B0403030403020204" pitchFamily="34" charset="0"/>
-              </a:rPr>
-              <a:t>for (</a:t>
-            </a:r>
-            <a:r>
-              <a:rPr lang="en-US" sz="1600" dirty="0" err="1">
-                <a:latin typeface="Consolas" panose="020B0609020204030204" pitchFamily="49" charset="0"/>
-                <a:ea typeface="Source Sans Pro Light" panose="020B0403030403020204" pitchFamily="34" charset="0"/>
-              </a:rPr>
-              <a:t>i</a:t>
-            </a:r>
-            <a:r>
-              <a:rPr lang="en-US" sz="1600" dirty="0">
-                <a:latin typeface="Consolas" panose="020B0609020204030204" pitchFamily="49" charset="0"/>
-                <a:ea typeface="Source Sans Pro Light" panose="020B0403030403020204" pitchFamily="34" charset="0"/>
-              </a:rPr>
-              <a:t> in array)</a:t>
-            </a:r>
-          </a:p>
-          <a:p>
-            <a:pPr marL="0" indent="0">
-              <a:buNone/>
-            </a:pPr>
-            <a:r>
-              <a:rPr lang="en-US" sz="1600" dirty="0">
-                <a:latin typeface="Consolas" panose="020B0609020204030204" pitchFamily="49" charset="0"/>
-                <a:ea typeface="Source Sans Pro Light" panose="020B0403030403020204" pitchFamily="34" charset="0"/>
-              </a:rPr>
-              <a:t>  for (j in </a:t>
-            </a:r>
-            <a:r>
-              <a:rPr lang="en-US" sz="1600" dirty="0" err="1">
-                <a:latin typeface="Consolas" panose="020B0609020204030204" pitchFamily="49" charset="0"/>
-                <a:ea typeface="Source Sans Pro Light" panose="020B0403030403020204" pitchFamily="34" charset="0"/>
-              </a:rPr>
-              <a:t>i</a:t>
-            </a:r>
-            <a:r>
-              <a:rPr lang="en-US" sz="1600" dirty="0">
-                <a:latin typeface="Consolas" panose="020B0609020204030204" pitchFamily="49" charset="0"/>
-                <a:ea typeface="Source Sans Pro Light" panose="020B0403030403020204" pitchFamily="34" charset="0"/>
-              </a:rPr>
-              <a:t>)</a:t>
-            </a:r>
-          </a:p>
-          <a:p>
-            <a:pPr marL="0" indent="0">
-              <a:buNone/>
-            </a:pPr>
-            <a:r>
-              <a:rPr lang="en-US" sz="1600" dirty="0">
-                <a:latin typeface="Consolas" panose="020B0609020204030204" pitchFamily="49" charset="0"/>
-                <a:ea typeface="Source Sans Pro Light" panose="020B0403030403020204" pitchFamily="34" charset="0"/>
-              </a:rPr>
-              <a:t>    ... do something with y ...</a:t>
+                <a:latin typeface="Consolas" panose="020B0609020204030204" pitchFamily="49" charset="0"/>
+                <a:ea typeface="Source Sans Pro Light" panose="020B0403030403020204" pitchFamily="34" charset="0"/>
+              </a:rPr>
+              <a:t>}</a:t>
             </a:r>
           </a:p>
           <a:p>
@@ -11219,12 +11113,39 @@
               <a:ea typeface="Source Sans Pro Light" panose="020B0403030403020204" pitchFamily="34" charset="0"/>
             </a:endParaRPr>
           </a:p>
+          <a:p>
+            <a:pPr marL="0" indent="0">
+              <a:buNone/>
+            </a:pPr>
+            <a:endParaRPr lang="en-US" sz="1600" dirty="0">
+              <a:latin typeface="Consolas" panose="020B0609020204030204" pitchFamily="49" charset="0"/>
+              <a:ea typeface="Source Sans Pro Light" panose="020B0403030403020204" pitchFamily="34" charset="0"/>
+            </a:endParaRPr>
+          </a:p>
+          <a:p>
+            <a:pPr marL="0" indent="0">
+              <a:buNone/>
+            </a:pPr>
+            <a:endParaRPr lang="en-US" sz="1600" dirty="0">
+              <a:latin typeface="Consolas" panose="020B0609020204030204" pitchFamily="49" charset="0"/>
+              <a:ea typeface="Source Sans Pro Light" panose="020B0403030403020204" pitchFamily="34" charset="0"/>
+            </a:endParaRPr>
+          </a:p>
+          <a:p>
+            <a:pPr marL="0" indent="0">
+              <a:buNone/>
+            </a:pPr>
+            <a:endParaRPr lang="en-US" sz="1600" dirty="0">
+              <a:latin typeface="Consolas" panose="020B0609020204030204" pitchFamily="49" charset="0"/>
+              <a:ea typeface="Source Sans Pro Light" panose="020B0403030403020204" pitchFamily="34" charset="0"/>
+            </a:endParaRPr>
+          </a:p>
         </p:txBody>
       </p:sp>
     </p:spTree>
     <p:extLst>
       <p:ext uri="{BB962C8B-B14F-4D97-AF65-F5344CB8AC3E}">
-        <p14:creationId xmlns:p14="http://schemas.microsoft.com/office/powerpoint/2010/main" val="1337217364"/>
+        <p14:creationId xmlns:p14="http://schemas.microsoft.com/office/powerpoint/2010/main" val="2003124061"/>
       </p:ext>
     </p:extLst>
   </p:cSld>
@@ -11251,43 +11172,6 @@
           <a:chExt cx="0" cy="0"/>
         </a:xfrm>
       </p:grpSpPr>
-      <p:pic>
-        <p:nvPicPr>
-          <p:cNvPr id="4" name="Picture 3" descr="Logo, company name&#10;&#10;Description automatically generated">
-            <a:extLst>
-              <a:ext uri="{FF2B5EF4-FFF2-40B4-BE49-F238E27FC236}">
-                <a16:creationId xmlns:a16="http://schemas.microsoft.com/office/drawing/2014/main" id="{B843C928-BA92-4E3B-A771-AAED350D87B3}"/>
-              </a:ext>
-            </a:extLst>
-          </p:cNvPr>
-          <p:cNvPicPr>
-            <a:picLocks noChangeAspect="1"/>
-          </p:cNvPicPr>
-          <p:nvPr/>
-        </p:nvPicPr>
-        <p:blipFill>
-          <a:blip r:embed="rId2">
-            <a:alphaModFix amt="5000"/>
-            <a:extLst>
-              <a:ext uri="{28A0092B-C50C-407E-A947-70E740481C1C}">
-                <a14:useLocalDpi xmlns:a14="http://schemas.microsoft.com/office/drawing/2010/main" val="0"/>
-              </a:ext>
-            </a:extLst>
-          </a:blip>
-          <a:stretch>
-            <a:fillRect/>
-          </a:stretch>
-        </p:blipFill>
-        <p:spPr>
-          <a:xfrm>
-            <a:off x="2030642" y="314459"/>
-            <a:ext cx="5082715" cy="5096270"/>
-          </a:xfrm>
-          <a:prstGeom prst="rect">
-            <a:avLst/>
-          </a:prstGeom>
-        </p:spPr>
-      </p:pic>
       <p:sp>
         <p:nvSpPr>
           <p:cNvPr id="2" name="Title 1">
@@ -11316,11 +11200,143 @@
                 <a:latin typeface="Source Sans Pro" panose="020B0503030403020204" pitchFamily="34" charset="0"/>
                 <a:ea typeface="Source Sans Pro" panose="020B0503030403020204" pitchFamily="34" charset="0"/>
               </a:rPr>
-              <a:t>While statements, break and continue</a:t>
+              <a:t>The functions block</a:t>
             </a:r>
             <a:endParaRPr lang="LID4096" sz="2800" b="1" dirty="0">
               <a:latin typeface="Source Sans Pro" panose="020B0503030403020204" pitchFamily="34" charset="0"/>
               <a:ea typeface="Source Sans Pro" panose="020B0503030403020204" pitchFamily="34" charset="0"/>
+            </a:endParaRPr>
+          </a:p>
+        </p:txBody>
+      </p:sp>
+      <p:sp>
+        <p:nvSpPr>
+          <p:cNvPr id="3" name="Content Placeholder 2">
+            <a:extLst>
+              <a:ext uri="{FF2B5EF4-FFF2-40B4-BE49-F238E27FC236}">
+                <a16:creationId xmlns:a16="http://schemas.microsoft.com/office/drawing/2014/main" id="{02774E1B-7E41-4FBF-B60A-597EA771BF83}"/>
+              </a:ext>
+            </a:extLst>
+          </p:cNvPr>
+          <p:cNvSpPr>
+            <a:spLocks noGrp="1"/>
+          </p:cNvSpPr>
+          <p:nvPr>
+            <p:ph idx="1"/>
+          </p:nvPr>
+        </p:nvSpPr>
+        <p:spPr>
+          <a:xfrm>
+            <a:off x="628649" y="1521354"/>
+            <a:ext cx="7886699" cy="3626115"/>
+          </a:xfrm>
+        </p:spPr>
+        <p:txBody>
+          <a:bodyPr/>
+          <a:lstStyle/>
+          <a:p>
+            <a:pPr marL="0" indent="0">
+              <a:buNone/>
+            </a:pPr>
+            <a:r>
+              <a:rPr lang="en-US" sz="2000" dirty="0">
+                <a:latin typeface="Consolas" panose="020B0609020204030204" pitchFamily="49" charset="0"/>
+                <a:ea typeface="Source Sans Pro Light" panose="020B0403030403020204" pitchFamily="34" charset="0"/>
+              </a:rPr>
+              <a:t>functions {</a:t>
+            </a:r>
+          </a:p>
+          <a:p>
+            <a:pPr marL="0" indent="0">
+              <a:buNone/>
+            </a:pPr>
+            <a:r>
+              <a:rPr lang="en-US" sz="2000" dirty="0">
+                <a:latin typeface="Consolas" panose="020B0609020204030204" pitchFamily="49" charset="0"/>
+                <a:ea typeface="Source Sans Pro Light" panose="020B0403030403020204" pitchFamily="34" charset="0"/>
+              </a:rPr>
+              <a:t>  </a:t>
+            </a:r>
+            <a:r>
+              <a:rPr lang="en-US" sz="2000" dirty="0">
+                <a:solidFill>
+                  <a:schemeClr val="bg1">
+                    <a:lumMod val="65000"/>
+                  </a:schemeClr>
+                </a:solidFill>
+                <a:latin typeface="Consolas" panose="020B0609020204030204" pitchFamily="49" charset="0"/>
+                <a:ea typeface="Source Sans Pro Light" panose="020B0403030403020204" pitchFamily="34" charset="0"/>
+              </a:rPr>
+              <a:t>// custom user-defined functions</a:t>
+            </a:r>
+          </a:p>
+          <a:p>
+            <a:pPr marL="0" indent="0">
+              <a:buNone/>
+            </a:pPr>
+            <a:r>
+              <a:rPr lang="en-US" sz="2000" dirty="0">
+                <a:latin typeface="Consolas" panose="020B0609020204030204" pitchFamily="49" charset="0"/>
+                <a:ea typeface="Source Sans Pro Light" panose="020B0403030403020204" pitchFamily="34" charset="0"/>
+              </a:rPr>
+              <a:t>  ... function declarations and definitions ...</a:t>
+            </a:r>
+          </a:p>
+          <a:p>
+            <a:pPr marL="0" indent="0">
+              <a:buNone/>
+            </a:pPr>
+            <a:r>
+              <a:rPr lang="en-US" sz="2000" dirty="0">
+                <a:latin typeface="Consolas" panose="020B0609020204030204" pitchFamily="49" charset="0"/>
+                <a:ea typeface="Source Sans Pro Light" panose="020B0403030403020204" pitchFamily="34" charset="0"/>
+              </a:rPr>
+              <a:t>}</a:t>
+            </a:r>
+          </a:p>
+          <a:p>
+            <a:pPr marL="0" indent="0">
+              <a:buNone/>
+            </a:pPr>
+            <a:endParaRPr lang="en-US" sz="2000" dirty="0">
+              <a:latin typeface="Consolas" panose="020B0609020204030204" pitchFamily="49" charset="0"/>
+              <a:ea typeface="Source Sans Pro Light" panose="020B0403030403020204" pitchFamily="34" charset="0"/>
+            </a:endParaRPr>
+          </a:p>
+          <a:p>
+            <a:r>
+              <a:rPr lang="en-US" sz="2000" dirty="0">
+                <a:latin typeface="Source Sans Pro Light" panose="020B0403030403020204" pitchFamily="34" charset="0"/>
+                <a:ea typeface="Source Sans Pro Light" panose="020B0403030403020204" pitchFamily="34" charset="0"/>
+              </a:rPr>
+              <a:t>This block is placed at the top of your Stan program.</a:t>
+            </a:r>
+          </a:p>
+          <a:p>
+            <a:endParaRPr lang="en-US" sz="2000" dirty="0">
+              <a:latin typeface="Source Sans Pro Light" panose="020B0403030403020204" pitchFamily="34" charset="0"/>
+              <a:ea typeface="Source Sans Pro Light" panose="020B0403030403020204" pitchFamily="34" charset="0"/>
+            </a:endParaRPr>
+          </a:p>
+          <a:p>
+            <a:r>
+              <a:rPr lang="en-US" sz="2000" dirty="0">
+                <a:latin typeface="Source Sans Pro Light" panose="020B0403030403020204" pitchFamily="34" charset="0"/>
+                <a:ea typeface="Source Sans Pro Light" panose="020B0403030403020204" pitchFamily="34" charset="0"/>
+              </a:rPr>
+              <a:t>In it you can code up any custom functions that will help you in your work.</a:t>
+            </a:r>
+          </a:p>
+          <a:p>
+            <a:endParaRPr lang="en-US" sz="2000" dirty="0">
+              <a:latin typeface="Source Sans Pro Light" panose="020B0403030403020204" pitchFamily="34" charset="0"/>
+              <a:ea typeface="Source Sans Pro Light" panose="020B0403030403020204" pitchFamily="34" charset="0"/>
+            </a:endParaRPr>
+          </a:p>
+          <a:p>
+            <a:endParaRPr lang="en-US" sz="2000" dirty="0">
+              <a:latin typeface="Consolas" panose="020B0609020204030204" pitchFamily="49" charset="0"/>
+              <a:ea typeface="Source Sans Pro Light" panose="020B0403030403020204" pitchFamily="34" charset="0"/>
             </a:endParaRPr>
           </a:p>
         </p:txBody>
@@ -11373,231 +11389,10 @@
           </a:p>
         </p:txBody>
       </p:sp>
-      <p:sp>
-        <p:nvSpPr>
-          <p:cNvPr id="7" name="Content Placeholder 6">
-            <a:extLst>
-              <a:ext uri="{FF2B5EF4-FFF2-40B4-BE49-F238E27FC236}">
-                <a16:creationId xmlns:a16="http://schemas.microsoft.com/office/drawing/2014/main" id="{831C9922-9DC3-4CEF-9A97-4C65415BF300}"/>
-              </a:ext>
-            </a:extLst>
-          </p:cNvPr>
-          <p:cNvSpPr>
-            <a:spLocks noGrp="1"/>
-          </p:cNvSpPr>
-          <p:nvPr>
-            <p:ph idx="1"/>
-          </p:nvPr>
-        </p:nvSpPr>
-        <p:spPr/>
-        <p:txBody>
-          <a:bodyPr>
-            <a:noAutofit/>
-          </a:bodyPr>
-          <a:lstStyle/>
-          <a:p>
-            <a:pPr marL="0" indent="0">
-              <a:buNone/>
-            </a:pPr>
-            <a:r>
-              <a:rPr lang="en-US" sz="1600" dirty="0">
-                <a:latin typeface="Consolas" panose="020B0609020204030204" pitchFamily="49" charset="0"/>
-                <a:ea typeface="Source Sans Pro Light" panose="020B0403030403020204" pitchFamily="34" charset="0"/>
-              </a:rPr>
-              <a:t>while (condition) {</a:t>
-            </a:r>
-          </a:p>
-          <a:p>
-            <a:pPr marL="0" indent="0">
-              <a:buNone/>
-            </a:pPr>
-            <a:r>
-              <a:rPr lang="en-US" sz="1600" dirty="0">
-                <a:latin typeface="Consolas" panose="020B0609020204030204" pitchFamily="49" charset="0"/>
-                <a:ea typeface="Source Sans Pro Light" panose="020B0403030403020204" pitchFamily="34" charset="0"/>
-              </a:rPr>
-              <a:t>  if (x[n] &gt;= 0) continue;</a:t>
-            </a:r>
-          </a:p>
-          <a:p>
-            <a:pPr marL="0" indent="0">
-              <a:buNone/>
-            </a:pPr>
-            <a:r>
-              <a:rPr lang="en-US" sz="1600" dirty="0">
-                <a:latin typeface="Consolas" panose="020B0609020204030204" pitchFamily="49" charset="0"/>
-                <a:ea typeface="Source Sans Pro Light" panose="020B0403030403020204" pitchFamily="34" charset="0"/>
-              </a:rPr>
-              <a:t>  </a:t>
-            </a:r>
-            <a:r>
-              <a:rPr lang="en-US" sz="1600" dirty="0">
-                <a:solidFill>
-                  <a:schemeClr val="bg1">
-                    <a:lumMod val="65000"/>
-                  </a:schemeClr>
-                </a:solidFill>
-                <a:latin typeface="Consolas" panose="020B0609020204030204" pitchFamily="49" charset="0"/>
-                <a:ea typeface="Source Sans Pro Light" panose="020B0403030403020204" pitchFamily="34" charset="0"/>
-              </a:rPr>
-              <a:t>// if above holds the line below will be skipped due to continue</a:t>
-            </a:r>
-            <a:endParaRPr lang="en-US" sz="1600" dirty="0">
-              <a:latin typeface="Consolas" panose="020B0609020204030204" pitchFamily="49" charset="0"/>
-              <a:ea typeface="Source Sans Pro Light" panose="020B0403030403020204" pitchFamily="34" charset="0"/>
-            </a:endParaRPr>
-          </a:p>
-          <a:p>
-            <a:pPr marL="0" indent="0">
-              <a:buNone/>
-            </a:pPr>
-            <a:r>
-              <a:rPr lang="en-US" sz="1600" dirty="0">
-                <a:latin typeface="Consolas" panose="020B0609020204030204" pitchFamily="49" charset="0"/>
-                <a:ea typeface="Source Sans Pro Light" panose="020B0403030403020204" pitchFamily="34" charset="0"/>
-              </a:rPr>
-              <a:t>  sum += x[n];</a:t>
-            </a:r>
-          </a:p>
-          <a:p>
-            <a:pPr marL="0" indent="0">
-              <a:buNone/>
-            </a:pPr>
-            <a:r>
-              <a:rPr lang="en-US" sz="1600" dirty="0">
-                <a:latin typeface="Consolas" panose="020B0609020204030204" pitchFamily="49" charset="0"/>
-                <a:ea typeface="Source Sans Pro Light" panose="020B0403030403020204" pitchFamily="34" charset="0"/>
-              </a:rPr>
-              <a:t>}</a:t>
-            </a:r>
-          </a:p>
-          <a:p>
-            <a:pPr marL="0" indent="0">
-              <a:buNone/>
-            </a:pPr>
-            <a:endParaRPr lang="en-US" sz="1600" dirty="0">
-              <a:latin typeface="Consolas" panose="020B0609020204030204" pitchFamily="49" charset="0"/>
-              <a:ea typeface="Source Sans Pro Light" panose="020B0403030403020204" pitchFamily="34" charset="0"/>
-            </a:endParaRPr>
-          </a:p>
-          <a:p>
-            <a:pPr marL="0" indent="0">
-              <a:buNone/>
-            </a:pPr>
-            <a:r>
-              <a:rPr lang="en-US" sz="1600" dirty="0">
-                <a:latin typeface="Consolas" panose="020B0609020204030204" pitchFamily="49" charset="0"/>
-                <a:ea typeface="Source Sans Pro Light" panose="020B0403030403020204" pitchFamily="34" charset="0"/>
-              </a:rPr>
-              <a:t>while (condition) {</a:t>
-            </a:r>
-          </a:p>
-          <a:p>
-            <a:pPr marL="0" indent="0">
-              <a:buNone/>
-            </a:pPr>
-            <a:r>
-              <a:rPr lang="en-US" sz="1600" dirty="0">
-                <a:latin typeface="Consolas" panose="020B0609020204030204" pitchFamily="49" charset="0"/>
-                <a:ea typeface="Source Sans Pro Light" panose="020B0403030403020204" pitchFamily="34" charset="0"/>
-              </a:rPr>
-              <a:t>  if (x[n] &gt;= 0) break;</a:t>
-            </a:r>
-          </a:p>
-          <a:p>
-            <a:pPr marL="0" indent="0">
-              <a:buNone/>
-            </a:pPr>
-            <a:r>
-              <a:rPr lang="en-US" sz="1600" dirty="0">
-                <a:latin typeface="Consolas" panose="020B0609020204030204" pitchFamily="49" charset="0"/>
-                <a:ea typeface="Source Sans Pro Light" panose="020B0403030403020204" pitchFamily="34" charset="0"/>
-              </a:rPr>
-              <a:t>  </a:t>
-            </a:r>
-            <a:r>
-              <a:rPr lang="en-US" sz="1600" dirty="0">
-                <a:solidFill>
-                  <a:schemeClr val="bg1">
-                    <a:lumMod val="65000"/>
-                  </a:schemeClr>
-                </a:solidFill>
-                <a:latin typeface="Consolas" panose="020B0609020204030204" pitchFamily="49" charset="0"/>
-                <a:ea typeface="Source Sans Pro Light" panose="020B0403030403020204" pitchFamily="34" charset="0"/>
-              </a:rPr>
-              <a:t>// if above is true, while loop will exit</a:t>
-            </a:r>
-            <a:endParaRPr lang="en-US" sz="1600" dirty="0">
-              <a:latin typeface="Consolas" panose="020B0609020204030204" pitchFamily="49" charset="0"/>
-              <a:ea typeface="Source Sans Pro Light" panose="020B0403030403020204" pitchFamily="34" charset="0"/>
-            </a:endParaRPr>
-          </a:p>
-          <a:p>
-            <a:pPr marL="0" indent="0">
-              <a:buNone/>
-            </a:pPr>
-            <a:r>
-              <a:rPr lang="en-US" sz="1600" dirty="0">
-                <a:latin typeface="Consolas" panose="020B0609020204030204" pitchFamily="49" charset="0"/>
-                <a:ea typeface="Source Sans Pro Light" panose="020B0403030403020204" pitchFamily="34" charset="0"/>
-              </a:rPr>
-              <a:t>  sum += x[n];</a:t>
-            </a:r>
-          </a:p>
-          <a:p>
-            <a:pPr marL="0" indent="0">
-              <a:buNone/>
-            </a:pPr>
-            <a:r>
-              <a:rPr lang="en-US" sz="1600" dirty="0">
-                <a:latin typeface="Consolas" panose="020B0609020204030204" pitchFamily="49" charset="0"/>
-                <a:ea typeface="Source Sans Pro Light" panose="020B0403030403020204" pitchFamily="34" charset="0"/>
-              </a:rPr>
-              <a:t>}</a:t>
-            </a:r>
-          </a:p>
-          <a:p>
-            <a:pPr marL="0" indent="0">
-              <a:buNone/>
-            </a:pPr>
-            <a:endParaRPr lang="en-US" sz="1600" dirty="0">
-              <a:latin typeface="Consolas" panose="020B0609020204030204" pitchFamily="49" charset="0"/>
-              <a:ea typeface="Source Sans Pro Light" panose="020B0403030403020204" pitchFamily="34" charset="0"/>
-            </a:endParaRPr>
-          </a:p>
-          <a:p>
-            <a:pPr marL="0" indent="0">
-              <a:buNone/>
-            </a:pPr>
-            <a:endParaRPr lang="en-US" sz="1600" dirty="0">
-              <a:latin typeface="Consolas" panose="020B0609020204030204" pitchFamily="49" charset="0"/>
-              <a:ea typeface="Source Sans Pro Light" panose="020B0403030403020204" pitchFamily="34" charset="0"/>
-            </a:endParaRPr>
-          </a:p>
-          <a:p>
-            <a:pPr marL="0" indent="0">
-              <a:buNone/>
-            </a:pPr>
-            <a:endParaRPr lang="en-US" sz="1600" dirty="0">
-              <a:latin typeface="Consolas" panose="020B0609020204030204" pitchFamily="49" charset="0"/>
-              <a:ea typeface="Source Sans Pro Light" panose="020B0403030403020204" pitchFamily="34" charset="0"/>
-            </a:endParaRPr>
-          </a:p>
-          <a:p>
-            <a:pPr marL="0" indent="0">
-              <a:buNone/>
-            </a:pPr>
-            <a:endParaRPr lang="en-US" sz="1600" dirty="0">
-              <a:latin typeface="Consolas" panose="020B0609020204030204" pitchFamily="49" charset="0"/>
-              <a:ea typeface="Source Sans Pro Light" panose="020B0403030403020204" pitchFamily="34" charset="0"/>
-            </a:endParaRPr>
-          </a:p>
-        </p:txBody>
-      </p:sp>
     </p:spTree>
     <p:extLst>
       <p:ext uri="{BB962C8B-B14F-4D97-AF65-F5344CB8AC3E}">
-        <p14:creationId xmlns:p14="http://schemas.microsoft.com/office/powerpoint/2010/main" val="2113531947"/>
+        <p14:creationId xmlns:p14="http://schemas.microsoft.com/office/powerpoint/2010/main" val="15592896"/>
       </p:ext>
     </p:extLst>
   </p:cSld>
@@ -11624,43 +11419,6 @@
           <a:chExt cx="0" cy="0"/>
         </a:xfrm>
       </p:grpSpPr>
-      <p:pic>
-        <p:nvPicPr>
-          <p:cNvPr id="4" name="Picture 3" descr="Logo, company name&#10;&#10;Description automatically generated">
-            <a:extLst>
-              <a:ext uri="{FF2B5EF4-FFF2-40B4-BE49-F238E27FC236}">
-                <a16:creationId xmlns:a16="http://schemas.microsoft.com/office/drawing/2014/main" id="{B843C928-BA92-4E3B-A771-AAED350D87B3}"/>
-              </a:ext>
-            </a:extLst>
-          </p:cNvPr>
-          <p:cNvPicPr>
-            <a:picLocks noChangeAspect="1"/>
-          </p:cNvPicPr>
-          <p:nvPr/>
-        </p:nvPicPr>
-        <p:blipFill>
-          <a:blip r:embed="rId2">
-            <a:alphaModFix amt="5000"/>
-            <a:extLst>
-              <a:ext uri="{28A0092B-C50C-407E-A947-70E740481C1C}">
-                <a14:useLocalDpi xmlns:a14="http://schemas.microsoft.com/office/drawing/2010/main" val="0"/>
-              </a:ext>
-            </a:extLst>
-          </a:blip>
-          <a:stretch>
-            <a:fillRect/>
-          </a:stretch>
-        </p:blipFill>
-        <p:spPr>
-          <a:xfrm>
-            <a:off x="2030642" y="314459"/>
-            <a:ext cx="5082715" cy="5096270"/>
-          </a:xfrm>
-          <a:prstGeom prst="rect">
-            <a:avLst/>
-          </a:prstGeom>
-        </p:spPr>
-      </p:pic>
       <p:sp>
         <p:nvSpPr>
           <p:cNvPr id="2" name="Title 1">
@@ -11689,11 +11447,159 @@
                 <a:latin typeface="Source Sans Pro" panose="020B0503030403020204" pitchFamily="34" charset="0"/>
                 <a:ea typeface="Source Sans Pro" panose="020B0503030403020204" pitchFamily="34" charset="0"/>
               </a:rPr>
-              <a:t>While statements, break and continue</a:t>
+              <a:t>The transformed data block</a:t>
             </a:r>
             <a:endParaRPr lang="LID4096" sz="2800" b="1" dirty="0">
               <a:latin typeface="Source Sans Pro" panose="020B0503030403020204" pitchFamily="34" charset="0"/>
               <a:ea typeface="Source Sans Pro" panose="020B0503030403020204" pitchFamily="34" charset="0"/>
+            </a:endParaRPr>
+          </a:p>
+        </p:txBody>
+      </p:sp>
+      <p:sp>
+        <p:nvSpPr>
+          <p:cNvPr id="3" name="Content Placeholder 2">
+            <a:extLst>
+              <a:ext uri="{FF2B5EF4-FFF2-40B4-BE49-F238E27FC236}">
+                <a16:creationId xmlns:a16="http://schemas.microsoft.com/office/drawing/2014/main" id="{02774E1B-7E41-4FBF-B60A-597EA771BF83}"/>
+              </a:ext>
+            </a:extLst>
+          </p:cNvPr>
+          <p:cNvSpPr>
+            <a:spLocks noGrp="1"/>
+          </p:cNvSpPr>
+          <p:nvPr>
+            <p:ph idx="1"/>
+          </p:nvPr>
+        </p:nvSpPr>
+        <p:spPr>
+          <a:xfrm>
+            <a:off x="628649" y="1521354"/>
+            <a:ext cx="7886699" cy="3626115"/>
+          </a:xfrm>
+        </p:spPr>
+        <p:txBody>
+          <a:bodyPr>
+            <a:normAutofit lnSpcReduction="10000"/>
+          </a:bodyPr>
+          <a:lstStyle/>
+          <a:p>
+            <a:pPr marL="0" indent="0">
+              <a:buNone/>
+            </a:pPr>
+            <a:r>
+              <a:rPr lang="en-US" sz="2000" dirty="0">
+                <a:latin typeface="Consolas" panose="020B0609020204030204" pitchFamily="49" charset="0"/>
+                <a:ea typeface="Source Sans Pro Light" panose="020B0403030403020204" pitchFamily="34" charset="0"/>
+              </a:rPr>
+              <a:t>transformed data {</a:t>
+            </a:r>
+          </a:p>
+          <a:p>
+            <a:pPr marL="0" indent="0">
+              <a:buNone/>
+            </a:pPr>
+            <a:r>
+              <a:rPr lang="en-US" sz="2000" dirty="0">
+                <a:latin typeface="Consolas" panose="020B0609020204030204" pitchFamily="49" charset="0"/>
+                <a:ea typeface="Source Sans Pro Light" panose="020B0403030403020204" pitchFamily="34" charset="0"/>
+              </a:rPr>
+              <a:t>  </a:t>
+            </a:r>
+            <a:r>
+              <a:rPr lang="en-US" sz="2000" dirty="0">
+                <a:solidFill>
+                  <a:schemeClr val="bg1">
+                    <a:lumMod val="65000"/>
+                  </a:schemeClr>
+                </a:solidFill>
+                <a:latin typeface="Consolas" panose="020B0609020204030204" pitchFamily="49" charset="0"/>
+                <a:ea typeface="Source Sans Pro Light" panose="020B0403030403020204" pitchFamily="34" charset="0"/>
+              </a:rPr>
+              <a:t>// mathematical transformations of the data</a:t>
+            </a:r>
+          </a:p>
+          <a:p>
+            <a:pPr marL="0" indent="0">
+              <a:buNone/>
+            </a:pPr>
+            <a:r>
+              <a:rPr lang="en-US" sz="2000" dirty="0">
+                <a:latin typeface="Consolas" panose="020B0609020204030204" pitchFamily="49" charset="0"/>
+                <a:ea typeface="Source Sans Pro Light" panose="020B0403030403020204" pitchFamily="34" charset="0"/>
+              </a:rPr>
+              <a:t>  ... declarations ...</a:t>
+            </a:r>
+          </a:p>
+          <a:p>
+            <a:pPr marL="0" indent="0">
+              <a:buNone/>
+            </a:pPr>
+            <a:r>
+              <a:rPr lang="en-US" sz="2000" dirty="0">
+                <a:latin typeface="Consolas" panose="020B0609020204030204" pitchFamily="49" charset="0"/>
+                <a:ea typeface="Source Sans Pro Light" panose="020B0403030403020204" pitchFamily="34" charset="0"/>
+              </a:rPr>
+              <a:t>  ... statements ...</a:t>
+            </a:r>
+          </a:p>
+          <a:p>
+            <a:pPr marL="0" indent="0">
+              <a:buNone/>
+            </a:pPr>
+            <a:r>
+              <a:rPr lang="en-US" sz="2000" dirty="0">
+                <a:latin typeface="Consolas" panose="020B0609020204030204" pitchFamily="49" charset="0"/>
+                <a:ea typeface="Source Sans Pro Light" panose="020B0403030403020204" pitchFamily="34" charset="0"/>
+              </a:rPr>
+              <a:t>}</a:t>
+            </a:r>
+          </a:p>
+          <a:p>
+            <a:pPr marL="0" indent="0">
+              <a:buNone/>
+            </a:pPr>
+            <a:endParaRPr lang="en-US" sz="2000" dirty="0">
+              <a:latin typeface="Consolas" panose="020B0609020204030204" pitchFamily="49" charset="0"/>
+              <a:ea typeface="Source Sans Pro Light" panose="020B0403030403020204" pitchFamily="34" charset="0"/>
+            </a:endParaRPr>
+          </a:p>
+          <a:p>
+            <a:r>
+              <a:rPr lang="en-US" sz="2000" dirty="0">
+                <a:latin typeface="Source Sans Pro Light" panose="020B0403030403020204" pitchFamily="34" charset="0"/>
+                <a:ea typeface="Source Sans Pro Light" panose="020B0403030403020204" pitchFamily="34" charset="0"/>
+              </a:rPr>
+              <a:t>This block is used to perform any transformation on the input data from the </a:t>
+            </a:r>
+            <a:r>
+              <a:rPr lang="en-US" sz="2000" dirty="0">
+                <a:latin typeface="Consolas" panose="020B0609020204030204" pitchFamily="49" charset="0"/>
+                <a:ea typeface="Source Sans Pro Light" panose="020B0403030403020204" pitchFamily="34" charset="0"/>
+              </a:rPr>
+              <a:t>data</a:t>
+            </a:r>
+            <a:r>
+              <a:rPr lang="en-US" sz="2000" dirty="0">
+                <a:latin typeface="Source Sans Pro Light" panose="020B0403030403020204" pitchFamily="34" charset="0"/>
+                <a:ea typeface="Source Sans Pro Light" panose="020B0403030403020204" pitchFamily="34" charset="0"/>
+              </a:rPr>
+              <a:t> block.</a:t>
+            </a:r>
+          </a:p>
+          <a:p>
+            <a:r>
+              <a:rPr lang="en-US" sz="2000" dirty="0">
+                <a:latin typeface="Source Sans Pro Light" panose="020B0403030403020204" pitchFamily="34" charset="0"/>
+                <a:ea typeface="Source Sans Pro Light" panose="020B0403030403020204" pitchFamily="34" charset="0"/>
+              </a:rPr>
+              <a:t>After transformations (e.g., normalization, standardization ...) are completed, Stan checks if transformed data meets the boundaries, we set on declared variables. If we violated our own constraints Stan errors out.</a:t>
+            </a:r>
+          </a:p>
+          <a:p>
+            <a:endParaRPr lang="en-US" sz="2000" dirty="0">
+              <a:latin typeface="Consolas" panose="020B0609020204030204" pitchFamily="49" charset="0"/>
+              <a:ea typeface="Source Sans Pro Light" panose="020B0403030403020204" pitchFamily="34" charset="0"/>
             </a:endParaRPr>
           </a:p>
         </p:txBody>
@@ -11746,231 +11652,10 @@
           </a:p>
         </p:txBody>
       </p:sp>
-      <p:sp>
-        <p:nvSpPr>
-          <p:cNvPr id="7" name="Content Placeholder 6">
-            <a:extLst>
-              <a:ext uri="{FF2B5EF4-FFF2-40B4-BE49-F238E27FC236}">
-                <a16:creationId xmlns:a16="http://schemas.microsoft.com/office/drawing/2014/main" id="{831C9922-9DC3-4CEF-9A97-4C65415BF300}"/>
-              </a:ext>
-            </a:extLst>
-          </p:cNvPr>
-          <p:cNvSpPr>
-            <a:spLocks noGrp="1"/>
-          </p:cNvSpPr>
-          <p:nvPr>
-            <p:ph idx="1"/>
-          </p:nvPr>
-        </p:nvSpPr>
-        <p:spPr/>
-        <p:txBody>
-          <a:bodyPr>
-            <a:noAutofit/>
-          </a:bodyPr>
-          <a:lstStyle/>
-          <a:p>
-            <a:pPr marL="0" indent="0">
-              <a:buNone/>
-            </a:pPr>
-            <a:r>
-              <a:rPr lang="en-US" sz="1600" dirty="0">
-                <a:latin typeface="Consolas" panose="020B0609020204030204" pitchFamily="49" charset="0"/>
-                <a:ea typeface="Source Sans Pro Light" panose="020B0403030403020204" pitchFamily="34" charset="0"/>
-              </a:rPr>
-              <a:t>while (condition) {</a:t>
-            </a:r>
-          </a:p>
-          <a:p>
-            <a:pPr marL="0" indent="0">
-              <a:buNone/>
-            </a:pPr>
-            <a:r>
-              <a:rPr lang="en-US" sz="1600" dirty="0">
-                <a:latin typeface="Consolas" panose="020B0609020204030204" pitchFamily="49" charset="0"/>
-                <a:ea typeface="Source Sans Pro Light" panose="020B0403030403020204" pitchFamily="34" charset="0"/>
-              </a:rPr>
-              <a:t>  if (x[n] &gt;= 0) continue;</a:t>
-            </a:r>
-          </a:p>
-          <a:p>
-            <a:pPr marL="0" indent="0">
-              <a:buNone/>
-            </a:pPr>
-            <a:r>
-              <a:rPr lang="en-US" sz="1600" dirty="0">
-                <a:latin typeface="Consolas" panose="020B0609020204030204" pitchFamily="49" charset="0"/>
-                <a:ea typeface="Source Sans Pro Light" panose="020B0403030403020204" pitchFamily="34" charset="0"/>
-              </a:rPr>
-              <a:t>  </a:t>
-            </a:r>
-            <a:r>
-              <a:rPr lang="en-US" sz="1600" dirty="0">
-                <a:solidFill>
-                  <a:schemeClr val="bg1">
-                    <a:lumMod val="65000"/>
-                  </a:schemeClr>
-                </a:solidFill>
-                <a:latin typeface="Consolas" panose="020B0609020204030204" pitchFamily="49" charset="0"/>
-                <a:ea typeface="Source Sans Pro Light" panose="020B0403030403020204" pitchFamily="34" charset="0"/>
-              </a:rPr>
-              <a:t>// if above holds the line below will be skipped due to continue</a:t>
-            </a:r>
-            <a:endParaRPr lang="en-US" sz="1600" dirty="0">
-              <a:latin typeface="Consolas" panose="020B0609020204030204" pitchFamily="49" charset="0"/>
-              <a:ea typeface="Source Sans Pro Light" panose="020B0403030403020204" pitchFamily="34" charset="0"/>
-            </a:endParaRPr>
-          </a:p>
-          <a:p>
-            <a:pPr marL="0" indent="0">
-              <a:buNone/>
-            </a:pPr>
-            <a:r>
-              <a:rPr lang="en-US" sz="1600" dirty="0">
-                <a:latin typeface="Consolas" panose="020B0609020204030204" pitchFamily="49" charset="0"/>
-                <a:ea typeface="Source Sans Pro Light" panose="020B0403030403020204" pitchFamily="34" charset="0"/>
-              </a:rPr>
-              <a:t>  sum += x[n];</a:t>
-            </a:r>
-          </a:p>
-          <a:p>
-            <a:pPr marL="0" indent="0">
-              <a:buNone/>
-            </a:pPr>
-            <a:r>
-              <a:rPr lang="en-US" sz="1600" dirty="0">
-                <a:latin typeface="Consolas" panose="020B0609020204030204" pitchFamily="49" charset="0"/>
-                <a:ea typeface="Source Sans Pro Light" panose="020B0403030403020204" pitchFamily="34" charset="0"/>
-              </a:rPr>
-              <a:t>}</a:t>
-            </a:r>
-          </a:p>
-          <a:p>
-            <a:pPr marL="0" indent="0">
-              <a:buNone/>
-            </a:pPr>
-            <a:endParaRPr lang="en-US" sz="1600" dirty="0">
-              <a:latin typeface="Consolas" panose="020B0609020204030204" pitchFamily="49" charset="0"/>
-              <a:ea typeface="Source Sans Pro Light" panose="020B0403030403020204" pitchFamily="34" charset="0"/>
-            </a:endParaRPr>
-          </a:p>
-          <a:p>
-            <a:pPr marL="0" indent="0">
-              <a:buNone/>
-            </a:pPr>
-            <a:r>
-              <a:rPr lang="en-US" sz="1600" dirty="0">
-                <a:latin typeface="Consolas" panose="020B0609020204030204" pitchFamily="49" charset="0"/>
-                <a:ea typeface="Source Sans Pro Light" panose="020B0403030403020204" pitchFamily="34" charset="0"/>
-              </a:rPr>
-              <a:t>while (condition) {</a:t>
-            </a:r>
-          </a:p>
-          <a:p>
-            <a:pPr marL="0" indent="0">
-              <a:buNone/>
-            </a:pPr>
-            <a:r>
-              <a:rPr lang="en-US" sz="1600" dirty="0">
-                <a:latin typeface="Consolas" panose="020B0609020204030204" pitchFamily="49" charset="0"/>
-                <a:ea typeface="Source Sans Pro Light" panose="020B0403030403020204" pitchFamily="34" charset="0"/>
-              </a:rPr>
-              <a:t>  if (x[n] &gt;= 0) break;</a:t>
-            </a:r>
-          </a:p>
-          <a:p>
-            <a:pPr marL="0" indent="0">
-              <a:buNone/>
-            </a:pPr>
-            <a:r>
-              <a:rPr lang="en-US" sz="1600" dirty="0">
-                <a:latin typeface="Consolas" panose="020B0609020204030204" pitchFamily="49" charset="0"/>
-                <a:ea typeface="Source Sans Pro Light" panose="020B0403030403020204" pitchFamily="34" charset="0"/>
-              </a:rPr>
-              <a:t>  </a:t>
-            </a:r>
-            <a:r>
-              <a:rPr lang="en-US" sz="1600" dirty="0">
-                <a:solidFill>
-                  <a:schemeClr val="bg1">
-                    <a:lumMod val="65000"/>
-                  </a:schemeClr>
-                </a:solidFill>
-                <a:latin typeface="Consolas" panose="020B0609020204030204" pitchFamily="49" charset="0"/>
-                <a:ea typeface="Source Sans Pro Light" panose="020B0403030403020204" pitchFamily="34" charset="0"/>
-              </a:rPr>
-              <a:t>// if above is true, while loop will exit</a:t>
-            </a:r>
-            <a:endParaRPr lang="en-US" sz="1600" dirty="0">
-              <a:latin typeface="Consolas" panose="020B0609020204030204" pitchFamily="49" charset="0"/>
-              <a:ea typeface="Source Sans Pro Light" panose="020B0403030403020204" pitchFamily="34" charset="0"/>
-            </a:endParaRPr>
-          </a:p>
-          <a:p>
-            <a:pPr marL="0" indent="0">
-              <a:buNone/>
-            </a:pPr>
-            <a:r>
-              <a:rPr lang="en-US" sz="1600" dirty="0">
-                <a:latin typeface="Consolas" panose="020B0609020204030204" pitchFamily="49" charset="0"/>
-                <a:ea typeface="Source Sans Pro Light" panose="020B0403030403020204" pitchFamily="34" charset="0"/>
-              </a:rPr>
-              <a:t>  sum += x[n];</a:t>
-            </a:r>
-          </a:p>
-          <a:p>
-            <a:pPr marL="0" indent="0">
-              <a:buNone/>
-            </a:pPr>
-            <a:r>
-              <a:rPr lang="en-US" sz="1600" dirty="0">
-                <a:latin typeface="Consolas" panose="020B0609020204030204" pitchFamily="49" charset="0"/>
-                <a:ea typeface="Source Sans Pro Light" panose="020B0403030403020204" pitchFamily="34" charset="0"/>
-              </a:rPr>
-              <a:t>}</a:t>
-            </a:r>
-          </a:p>
-          <a:p>
-            <a:pPr marL="0" indent="0">
-              <a:buNone/>
-            </a:pPr>
-            <a:endParaRPr lang="en-US" sz="1600" dirty="0">
-              <a:latin typeface="Consolas" panose="020B0609020204030204" pitchFamily="49" charset="0"/>
-              <a:ea typeface="Source Sans Pro Light" panose="020B0403030403020204" pitchFamily="34" charset="0"/>
-            </a:endParaRPr>
-          </a:p>
-          <a:p>
-            <a:pPr marL="0" indent="0">
-              <a:buNone/>
-            </a:pPr>
-            <a:endParaRPr lang="en-US" sz="1600" dirty="0">
-              <a:latin typeface="Consolas" panose="020B0609020204030204" pitchFamily="49" charset="0"/>
-              <a:ea typeface="Source Sans Pro Light" panose="020B0403030403020204" pitchFamily="34" charset="0"/>
-            </a:endParaRPr>
-          </a:p>
-          <a:p>
-            <a:pPr marL="0" indent="0">
-              <a:buNone/>
-            </a:pPr>
-            <a:endParaRPr lang="en-US" sz="1600" dirty="0">
-              <a:latin typeface="Consolas" panose="020B0609020204030204" pitchFamily="49" charset="0"/>
-              <a:ea typeface="Source Sans Pro Light" panose="020B0403030403020204" pitchFamily="34" charset="0"/>
-            </a:endParaRPr>
-          </a:p>
-          <a:p>
-            <a:pPr marL="0" indent="0">
-              <a:buNone/>
-            </a:pPr>
-            <a:endParaRPr lang="en-US" sz="1600" dirty="0">
-              <a:latin typeface="Consolas" panose="020B0609020204030204" pitchFamily="49" charset="0"/>
-              <a:ea typeface="Source Sans Pro Light" panose="020B0403030403020204" pitchFamily="34" charset="0"/>
-            </a:endParaRPr>
-          </a:p>
-        </p:txBody>
-      </p:sp>
     </p:spTree>
     <p:extLst>
       <p:ext uri="{BB962C8B-B14F-4D97-AF65-F5344CB8AC3E}">
-        <p14:creationId xmlns:p14="http://schemas.microsoft.com/office/powerpoint/2010/main" val="2003124061"/>
+        <p14:creationId xmlns:p14="http://schemas.microsoft.com/office/powerpoint/2010/main" val="2352728793"/>
       </p:ext>
     </p:extLst>
   </p:cSld>
@@ -12025,7 +11710,7 @@
                 <a:latin typeface="Source Sans Pro" panose="020B0503030403020204" pitchFamily="34" charset="0"/>
                 <a:ea typeface="Source Sans Pro" panose="020B0503030403020204" pitchFamily="34" charset="0"/>
               </a:rPr>
-              <a:t>The functions block</a:t>
+              <a:t>The transformed parameters block</a:t>
             </a:r>
             <a:endParaRPr lang="LID4096" sz="2800" b="1" dirty="0">
               <a:latin typeface="Source Sans Pro" panose="020B0503030403020204" pitchFamily="34" charset="0"/>
@@ -12057,7 +11742,9 @@
           </a:xfrm>
         </p:spPr>
         <p:txBody>
-          <a:bodyPr/>
+          <a:bodyPr>
+            <a:normAutofit lnSpcReduction="10000"/>
+          </a:bodyPr>
           <a:lstStyle/>
           <a:p>
             <a:pPr marL="0" indent="0">
@@ -12068,7 +11755,7 @@
                 <a:latin typeface="Consolas" panose="020B0609020204030204" pitchFamily="49" charset="0"/>
                 <a:ea typeface="Source Sans Pro Light" panose="020B0403030403020204" pitchFamily="34" charset="0"/>
               </a:rPr>
-              <a:t>functions {</a:t>
+              <a:t>transformed parameters {</a:t>
             </a:r>
           </a:p>
           <a:p>
@@ -12092,7 +11779,7 @@
                 <a:latin typeface="Consolas" panose="020B0609020204030204" pitchFamily="49" charset="0"/>
                 <a:ea typeface="Source Sans Pro Light" panose="020B0403030403020204" pitchFamily="34" charset="0"/>
               </a:rPr>
-              <a:t>// custom user-defined functions</a:t>
+              <a:t>// mathematical transformations of model’s parameters</a:t>
             </a:r>
           </a:p>
           <a:p>
@@ -12104,7 +11791,19 @@
                 <a:latin typeface="Consolas" panose="020B0609020204030204" pitchFamily="49" charset="0"/>
                 <a:ea typeface="Source Sans Pro Light" panose="020B0403030403020204" pitchFamily="34" charset="0"/>
               </a:rPr>
-              <a:t>  ... function declarations and definitions ...</a:t>
+              <a:t>  ... declarations ...</a:t>
+            </a:r>
+          </a:p>
+          <a:p>
+            <a:pPr marL="0" indent="0">
+              <a:buNone/>
+            </a:pPr>
+            <a:r>
+              <a:rPr lang="en-US" sz="2000" dirty="0">
+                <a:latin typeface="Consolas" panose="020B0609020204030204" pitchFamily="49" charset="0"/>
+                <a:ea typeface="Source Sans Pro Light" panose="020B0403030403020204" pitchFamily="34" charset="0"/>
+              </a:rPr>
+              <a:t>  ... statements ...</a:t>
             </a:r>
           </a:p>
           <a:p>
@@ -12134,29 +11833,40 @@
                 <a:latin typeface="Source Sans Pro Light" panose="020B0403030403020204" pitchFamily="34" charset="0"/>
                 <a:ea typeface="Source Sans Pro Light" panose="020B0403030403020204" pitchFamily="34" charset="0"/>
               </a:rPr>
-              <a:t>This block is placed at the top of your Stan program.</a:t>
-            </a:r>
-          </a:p>
-          <a:p>
-            <a:endParaRPr lang="en-US" sz="2000" dirty="0">
-              <a:latin typeface="Source Sans Pro Light" panose="020B0403030403020204" pitchFamily="34" charset="0"/>
-              <a:ea typeface="Source Sans Pro Light" panose="020B0403030403020204" pitchFamily="34" charset="0"/>
-            </a:endParaRPr>
-          </a:p>
-          <a:p>
+              <a:t>This block servers a similar purpose as the </a:t>
+            </a:r>
+            <a:r>
+              <a:rPr lang="en-US" sz="2000" dirty="0">
+                <a:latin typeface="Consolas" panose="020B0609020204030204" pitchFamily="49" charset="0"/>
+                <a:ea typeface="Source Sans Pro Light" panose="020B0403030403020204" pitchFamily="34" charset="0"/>
+              </a:rPr>
+              <a:t>transformed data</a:t>
+            </a:r>
             <a:r>
               <a:rPr lang="en-US" sz="2000" dirty="0">
                 <a:latin typeface="Source Sans Pro Light" panose="020B0403030403020204" pitchFamily="34" charset="0"/>
                 <a:ea typeface="Source Sans Pro Light" panose="020B0403030403020204" pitchFamily="34" charset="0"/>
               </a:rPr>
-              <a:t>In it you can code up any custom functions that will help you in your work.</a:t>
-            </a:r>
-          </a:p>
-          <a:p>
-            <a:endParaRPr lang="en-US" sz="2000" dirty="0">
-              <a:latin typeface="Source Sans Pro Light" panose="020B0403030403020204" pitchFamily="34" charset="0"/>
-              <a:ea typeface="Source Sans Pro Light" panose="020B0403030403020204" pitchFamily="34" charset="0"/>
-            </a:endParaRPr>
+              <a:t> block, except that this time we are transforming model’s parameters.</a:t>
+            </a:r>
+          </a:p>
+          <a:p>
+            <a:r>
+              <a:rPr lang="en-US" sz="2000" dirty="0">
+                <a:latin typeface="Source Sans Pro Light" panose="020B0403030403020204" pitchFamily="34" charset="0"/>
+                <a:ea typeface="Source Sans Pro Light" panose="020B0403030403020204" pitchFamily="34" charset="0"/>
+              </a:rPr>
+              <a:t>Transformed parameters are part of model’s output.</a:t>
+            </a:r>
+          </a:p>
+          <a:p>
+            <a:r>
+              <a:rPr lang="en-US" sz="2000" dirty="0">
+                <a:latin typeface="Source Sans Pro Light" panose="020B0403030403020204" pitchFamily="34" charset="0"/>
+                <a:ea typeface="Source Sans Pro Light" panose="020B0403030403020204" pitchFamily="34" charset="0"/>
+              </a:rPr>
+              <a:t>After statements are executed, Stan check the constraints we provided. If the parameter does not meet the constraints its value will be rejected.</a:t>
+            </a:r>
           </a:p>
           <a:p>
             <a:endParaRPr lang="en-US" sz="2000" dirty="0">
@@ -12217,7 +11927,7 @@
     </p:spTree>
     <p:extLst>
       <p:ext uri="{BB962C8B-B14F-4D97-AF65-F5344CB8AC3E}">
-        <p14:creationId xmlns:p14="http://schemas.microsoft.com/office/powerpoint/2010/main" val="15592896"/>
+        <p14:creationId xmlns:p14="http://schemas.microsoft.com/office/powerpoint/2010/main" val="1103223596"/>
       </p:ext>
     </p:extLst>
   </p:cSld>
@@ -12272,7 +11982,7 @@
                 <a:latin typeface="Source Sans Pro" panose="020B0503030403020204" pitchFamily="34" charset="0"/>
                 <a:ea typeface="Source Sans Pro" panose="020B0503030403020204" pitchFamily="34" charset="0"/>
               </a:rPr>
-              <a:t>The transformed data block</a:t>
+              <a:t>The generated quantities block</a:t>
             </a:r>
             <a:endParaRPr lang="LID4096" sz="2800" b="1" dirty="0">
               <a:latin typeface="Source Sans Pro" panose="020B0503030403020204" pitchFamily="34" charset="0"/>
@@ -12305,7 +12015,7 @@
         </p:spPr>
         <p:txBody>
           <a:bodyPr>
-            <a:normAutofit lnSpcReduction="10000"/>
+            <a:normAutofit fontScale="92500" lnSpcReduction="10000"/>
           </a:bodyPr>
           <a:lstStyle/>
           <a:p>
@@ -12317,7 +12027,7 @@
                 <a:latin typeface="Consolas" panose="020B0609020204030204" pitchFamily="49" charset="0"/>
                 <a:ea typeface="Source Sans Pro Light" panose="020B0403030403020204" pitchFamily="34" charset="0"/>
               </a:rPr>
-              <a:t>transformed data {</a:t>
+              <a:t>generated quantities {</a:t>
             </a:r>
           </a:p>
           <a:p>
@@ -12341,7 +12051,7 @@
                 <a:latin typeface="Consolas" panose="020B0609020204030204" pitchFamily="49" charset="0"/>
                 <a:ea typeface="Source Sans Pro Light" panose="020B0403030403020204" pitchFamily="34" charset="0"/>
               </a:rPr>
-              <a:t>// mathematical transformations of the data</a:t>
+              <a:t>// additional generated outputs</a:t>
             </a:r>
           </a:p>
           <a:p>
@@ -12395,33 +12105,21 @@
                 <a:latin typeface="Source Sans Pro Light" panose="020B0403030403020204" pitchFamily="34" charset="0"/>
                 <a:ea typeface="Source Sans Pro Light" panose="020B0403030403020204" pitchFamily="34" charset="0"/>
               </a:rPr>
-              <a:t>This block is used to perform any transformation on the input data from the </a:t>
-            </a:r>
-            <a:r>
-              <a:rPr lang="en-US" sz="2000" dirty="0">
-                <a:latin typeface="Consolas" panose="020B0609020204030204" pitchFamily="49" charset="0"/>
-                <a:ea typeface="Source Sans Pro Light" panose="020B0403030403020204" pitchFamily="34" charset="0"/>
-              </a:rPr>
-              <a:t>data</a:t>
-            </a:r>
+              <a:t>This block is rather different then other blocks as nothing in it affects the sampled parameter values.</a:t>
+            </a:r>
+            <a:endParaRPr lang="en-US" sz="2000" dirty="0">
+              <a:latin typeface="Consolas" panose="020B0609020204030204" pitchFamily="49" charset="0"/>
+              <a:ea typeface="Source Sans Pro Light" panose="020B0403030403020204" pitchFamily="34" charset="0"/>
+            </a:endParaRPr>
+          </a:p>
+          <a:p>
             <a:r>
               <a:rPr lang="en-US" sz="2000" dirty="0">
                 <a:latin typeface="Source Sans Pro Light" panose="020B0403030403020204" pitchFamily="34" charset="0"/>
                 <a:ea typeface="Source Sans Pro Light" panose="020B0403030403020204" pitchFamily="34" charset="0"/>
               </a:rPr>
-              <a:t> block.</a:t>
-            </a:r>
-          </a:p>
-          <a:p>
-            <a:r>
-              <a:rPr lang="en-US" sz="2000" dirty="0">
-                <a:latin typeface="Source Sans Pro Light" panose="020B0403030403020204" pitchFamily="34" charset="0"/>
-                <a:ea typeface="Source Sans Pro Light" panose="020B0403030403020204" pitchFamily="34" charset="0"/>
-              </a:rPr>
-              <a:t>After transformations (e.g., normalization, standardization ...) are completed, Stan checks if transformed data meets the boundaries, we set on declared variables. If we violated our own constraints Stan errors out.</a:t>
-            </a:r>
-          </a:p>
-          <a:p>
+              <a:t>This block is executed after a sample is generated, in it we can use model’s variables to generate custom quantities we are interested in (e.g., posterior event probabilities, comparisons between parameters, log likelihoods ...).</a:t>
+            </a:r>
             <a:endParaRPr lang="en-US" sz="2000" dirty="0">
               <a:latin typeface="Consolas" panose="020B0609020204030204" pitchFamily="49" charset="0"/>
               <a:ea typeface="Source Sans Pro Light" panose="020B0403030403020204" pitchFamily="34" charset="0"/>
@@ -12480,7 +12178,7 @@
     </p:spTree>
     <p:extLst>
       <p:ext uri="{BB962C8B-B14F-4D97-AF65-F5344CB8AC3E}">
-        <p14:creationId xmlns:p14="http://schemas.microsoft.com/office/powerpoint/2010/main" val="2352728793"/>
+        <p14:creationId xmlns:p14="http://schemas.microsoft.com/office/powerpoint/2010/main" val="3700523165"/>
       </p:ext>
     </p:extLst>
   </p:cSld>
@@ -12741,6 +12439,43 @@
           <a:chExt cx="0" cy="0"/>
         </a:xfrm>
       </p:grpSpPr>
+      <p:pic>
+        <p:nvPicPr>
+          <p:cNvPr id="4" name="Picture 3" descr="Logo, company name&#10;&#10;Description automatically generated">
+            <a:extLst>
+              <a:ext uri="{FF2B5EF4-FFF2-40B4-BE49-F238E27FC236}">
+                <a16:creationId xmlns:a16="http://schemas.microsoft.com/office/drawing/2014/main" id="{B843C928-BA92-4E3B-A771-AAED350D87B3}"/>
+              </a:ext>
+            </a:extLst>
+          </p:cNvPr>
+          <p:cNvPicPr>
+            <a:picLocks noChangeAspect="1"/>
+          </p:cNvPicPr>
+          <p:nvPr/>
+        </p:nvPicPr>
+        <p:blipFill>
+          <a:blip r:embed="rId3">
+            <a:alphaModFix amt="5000"/>
+            <a:extLst>
+              <a:ext uri="{28A0092B-C50C-407E-A947-70E740481C1C}">
+                <a14:useLocalDpi xmlns:a14="http://schemas.microsoft.com/office/drawing/2010/main" val="0"/>
+              </a:ext>
+            </a:extLst>
+          </a:blip>
+          <a:stretch>
+            <a:fillRect/>
+          </a:stretch>
+        </p:blipFill>
+        <p:spPr>
+          <a:xfrm>
+            <a:off x="2030642" y="309365"/>
+            <a:ext cx="5082715" cy="5096270"/>
+          </a:xfrm>
+          <a:prstGeom prst="rect">
+            <a:avLst/>
+          </a:prstGeom>
+        </p:spPr>
+      </p:pic>
       <p:sp>
         <p:nvSpPr>
           <p:cNvPr id="2" name="Title 1">
@@ -12769,7 +12504,7 @@
                 <a:latin typeface="Source Sans Pro" panose="020B0503030403020204" pitchFamily="34" charset="0"/>
                 <a:ea typeface="Source Sans Pro" panose="020B0503030403020204" pitchFamily="34" charset="0"/>
               </a:rPr>
-              <a:t>The transformed parameters block</a:t>
+              <a:t>Log posterior probability</a:t>
             </a:r>
             <a:endParaRPr lang="LID4096" sz="2800" b="1" dirty="0">
               <a:latin typeface="Source Sans Pro" panose="020B0503030403020204" pitchFamily="34" charset="0"/>
@@ -12802,136 +12537,223 @@
         </p:spPr>
         <p:txBody>
           <a:bodyPr>
-            <a:normAutofit lnSpcReduction="10000"/>
+            <a:normAutofit fontScale="92500" lnSpcReduction="10000"/>
           </a:bodyPr>
           <a:lstStyle/>
           <a:p>
-            <a:pPr marL="0" indent="0">
-              <a:buNone/>
-            </a:pPr>
-            <a:r>
-              <a:rPr lang="en-US" sz="2000" dirty="0">
-                <a:latin typeface="Consolas" panose="020B0609020204030204" pitchFamily="49" charset="0"/>
-                <a:ea typeface="Source Sans Pro Light" panose="020B0403030403020204" pitchFamily="34" charset="0"/>
-              </a:rPr>
-              <a:t>transformed parameters {</a:t>
-            </a:r>
-          </a:p>
-          <a:p>
-            <a:pPr marL="0" indent="0">
-              <a:buNone/>
-            </a:pPr>
-            <a:r>
-              <a:rPr lang="en-US" sz="2000" dirty="0">
-                <a:latin typeface="Consolas" panose="020B0609020204030204" pitchFamily="49" charset="0"/>
-                <a:ea typeface="Source Sans Pro Light" panose="020B0403030403020204" pitchFamily="34" charset="0"/>
-              </a:rPr>
-              <a:t>  </a:t>
-            </a:r>
-            <a:r>
-              <a:rPr lang="en-US" sz="2000" dirty="0">
-                <a:solidFill>
-                  <a:schemeClr val="bg1">
-                    <a:lumMod val="65000"/>
-                  </a:schemeClr>
-                </a:solidFill>
-                <a:latin typeface="Consolas" panose="020B0609020204030204" pitchFamily="49" charset="0"/>
-                <a:ea typeface="Source Sans Pro Light" panose="020B0403030403020204" pitchFamily="34" charset="0"/>
-              </a:rPr>
-              <a:t>// mathematical transformations of model’s parameters</a:t>
-            </a:r>
-          </a:p>
-          <a:p>
-            <a:pPr marL="0" indent="0">
-              <a:buNone/>
-            </a:pPr>
-            <a:r>
-              <a:rPr lang="en-US" sz="2000" dirty="0">
-                <a:latin typeface="Consolas" panose="020B0609020204030204" pitchFamily="49" charset="0"/>
-                <a:ea typeface="Source Sans Pro Light" panose="020B0403030403020204" pitchFamily="34" charset="0"/>
-              </a:rPr>
-              <a:t>  ... declarations ...</a:t>
-            </a:r>
-          </a:p>
-          <a:p>
-            <a:pPr marL="0" indent="0">
-              <a:buNone/>
-            </a:pPr>
-            <a:r>
-              <a:rPr lang="en-US" sz="2000" dirty="0">
-                <a:latin typeface="Consolas" panose="020B0609020204030204" pitchFamily="49" charset="0"/>
-                <a:ea typeface="Source Sans Pro Light" panose="020B0403030403020204" pitchFamily="34" charset="0"/>
-              </a:rPr>
-              <a:t>  ... statements ...</a:t>
-            </a:r>
-          </a:p>
-          <a:p>
-            <a:pPr marL="0" indent="0">
-              <a:buNone/>
-            </a:pPr>
-            <a:r>
-              <a:rPr lang="en-US" sz="2000" dirty="0">
-                <a:latin typeface="Consolas" panose="020B0609020204030204" pitchFamily="49" charset="0"/>
-                <a:ea typeface="Source Sans Pro Light" panose="020B0403030403020204" pitchFamily="34" charset="0"/>
-              </a:rPr>
-              <a:t>}</a:t>
-            </a:r>
-          </a:p>
-          <a:p>
-            <a:pPr marL="0" indent="0">
-              <a:buNone/>
-            </a:pPr>
+            <a:r>
+              <a:rPr lang="en-US" sz="2000" dirty="0">
+                <a:latin typeface="Source Sans Pro Light" panose="020B0403030403020204" pitchFamily="34" charset="0"/>
+                <a:ea typeface="Source Sans Pro Light" panose="020B0403030403020204" pitchFamily="34" charset="0"/>
+              </a:rPr>
+              <a:t>In the Bayesian setting a probabilistic program is a description of how to compute the posterior distribution. The essence of computation in Stan is dealing with the logarithm of the posterior probability density.</a:t>
+            </a:r>
+          </a:p>
+          <a:p>
+            <a:endParaRPr lang="en-US" sz="2000" dirty="0">
+              <a:latin typeface="Source Sans Pro Light" panose="020B0403030403020204" pitchFamily="34" charset="0"/>
+              <a:ea typeface="Source Sans Pro Light" panose="020B0403030403020204" pitchFamily="34" charset="0"/>
+            </a:endParaRPr>
+          </a:p>
+          <a:p>
+            <a:r>
+              <a:rPr lang="en-US" sz="2000" dirty="0">
+                <a:latin typeface="Source Sans Pro Light" panose="020B0403030403020204" pitchFamily="34" charset="0"/>
+                <a:ea typeface="Source Sans Pro Light" panose="020B0403030403020204" pitchFamily="34" charset="0"/>
+              </a:rPr>
+              <a:t>In practice </a:t>
+            </a:r>
+            <a:r>
+              <a:rPr lang="en-US" sz="2000" dirty="0">
+                <a:latin typeface="Consolas" panose="020B0609020204030204" pitchFamily="49" charset="0"/>
+                <a:ea typeface="Source Sans Pro Light" panose="020B0403030403020204" pitchFamily="34" charset="0"/>
+              </a:rPr>
+              <a:t>y[</a:t>
+            </a:r>
+            <a:r>
+              <a:rPr lang="en-US" sz="2000" dirty="0" err="1">
+                <a:latin typeface="Consolas" panose="020B0609020204030204" pitchFamily="49" charset="0"/>
+                <a:ea typeface="Source Sans Pro Light" panose="020B0403030403020204" pitchFamily="34" charset="0"/>
+              </a:rPr>
+              <a:t>i</a:t>
+            </a:r>
+            <a:r>
+              <a:rPr lang="en-US" sz="2000" dirty="0">
+                <a:latin typeface="Consolas" panose="020B0609020204030204" pitchFamily="49" charset="0"/>
+                <a:ea typeface="Source Sans Pro Light" panose="020B0403030403020204" pitchFamily="34" charset="0"/>
+              </a:rPr>
+              <a:t>] ~ normal(mu, sigma);</a:t>
+            </a:r>
+            <a:r>
+              <a:rPr lang="en-US" sz="2000" dirty="0">
+                <a:latin typeface="Source Sans Pro Light" panose="020B0403030403020204" pitchFamily="34" charset="0"/>
+                <a:ea typeface="Source Sans Pro Light" panose="020B0403030403020204" pitchFamily="34" charset="0"/>
+              </a:rPr>
+              <a:t> multiplies the current posterior probability by the density of the </a:t>
+            </a:r>
+            <a:r>
+              <a:rPr lang="en-US" sz="2000" dirty="0">
+                <a:latin typeface="Consolas" panose="020B0609020204030204" pitchFamily="49" charset="0"/>
+                <a:ea typeface="Source Sans Pro Light" panose="020B0403030403020204" pitchFamily="34" charset="0"/>
+              </a:rPr>
+              <a:t>normal</a:t>
+            </a:r>
+            <a:r>
+              <a:rPr lang="en-US" sz="2000" dirty="0">
+                <a:latin typeface="Source Sans Pro Light" panose="020B0403030403020204" pitchFamily="34" charset="0"/>
+                <a:ea typeface="Source Sans Pro Light" panose="020B0403030403020204" pitchFamily="34" charset="0"/>
+              </a:rPr>
+              <a:t> distribution at </a:t>
+            </a:r>
+            <a:r>
+              <a:rPr lang="en-US" sz="2000" dirty="0">
+                <a:latin typeface="Consolas" panose="020B0609020204030204" pitchFamily="49" charset="0"/>
+                <a:ea typeface="Source Sans Pro Light" panose="020B0403030403020204" pitchFamily="34" charset="0"/>
+              </a:rPr>
+              <a:t>y[</a:t>
+            </a:r>
+            <a:r>
+              <a:rPr lang="en-US" sz="2000" dirty="0" err="1">
+                <a:latin typeface="Consolas" panose="020B0609020204030204" pitchFamily="49" charset="0"/>
+                <a:ea typeface="Source Sans Pro Light" panose="020B0403030403020204" pitchFamily="34" charset="0"/>
+              </a:rPr>
+              <a:t>i</a:t>
+            </a:r>
+            <a:r>
+              <a:rPr lang="en-US" sz="2000" dirty="0">
+                <a:latin typeface="Consolas" panose="020B0609020204030204" pitchFamily="49" charset="0"/>
+                <a:ea typeface="Source Sans Pro Light" panose="020B0403030403020204" pitchFamily="34" charset="0"/>
+              </a:rPr>
+              <a:t>]</a:t>
+            </a:r>
+            <a:r>
+              <a:rPr lang="en-US" sz="2000" dirty="0">
+                <a:latin typeface="Source Sans Pro Light" panose="020B0403030403020204" pitchFamily="34" charset="0"/>
+                <a:ea typeface="Source Sans Pro Light" panose="020B0403030403020204" pitchFamily="34" charset="0"/>
+              </a:rPr>
+              <a:t>.</a:t>
+            </a:r>
+          </a:p>
+          <a:p>
+            <a:endParaRPr lang="en-US" sz="2000" dirty="0">
+              <a:latin typeface="Source Sans Pro Light" panose="020B0403030403020204" pitchFamily="34" charset="0"/>
+              <a:ea typeface="Source Sans Pro Light" panose="020B0403030403020204" pitchFamily="34" charset="0"/>
+            </a:endParaRPr>
+          </a:p>
+          <a:p>
+            <a:r>
+              <a:rPr lang="en-US" sz="2000" dirty="0">
+                <a:latin typeface="Source Sans Pro Light" panose="020B0403030403020204" pitchFamily="34" charset="0"/>
+                <a:ea typeface="Source Sans Pro Light" panose="020B0403030403020204" pitchFamily="34" charset="0"/>
+              </a:rPr>
+              <a:t>This is the same as an increment of current log-probability by the log-density of the normal distribution at </a:t>
+            </a:r>
+            <a:r>
+              <a:rPr lang="en-US" sz="2000" dirty="0">
+                <a:latin typeface="Consolas" panose="020B0609020204030204" pitchFamily="49" charset="0"/>
+                <a:ea typeface="Source Sans Pro Light" panose="020B0403030403020204" pitchFamily="34" charset="0"/>
+              </a:rPr>
+              <a:t>y[</a:t>
+            </a:r>
+            <a:r>
+              <a:rPr lang="en-US" sz="2000" dirty="0" err="1">
+                <a:latin typeface="Consolas" panose="020B0609020204030204" pitchFamily="49" charset="0"/>
+                <a:ea typeface="Source Sans Pro Light" panose="020B0403030403020204" pitchFamily="34" charset="0"/>
+              </a:rPr>
+              <a:t>i</a:t>
+            </a:r>
+            <a:r>
+              <a:rPr lang="en-US" sz="2000" dirty="0">
+                <a:latin typeface="Consolas" panose="020B0609020204030204" pitchFamily="49" charset="0"/>
+                <a:ea typeface="Source Sans Pro Light" panose="020B0403030403020204" pitchFamily="34" charset="0"/>
+              </a:rPr>
+              <a:t>]</a:t>
+            </a:r>
+            <a:r>
+              <a:rPr lang="en-US" sz="2000" dirty="0">
+                <a:latin typeface="Source Sans Pro Light" panose="020B0403030403020204" pitchFamily="34" charset="0"/>
+                <a:ea typeface="Source Sans Pro Light" panose="020B0403030403020204" pitchFamily="34" charset="0"/>
+              </a:rPr>
+              <a:t>.</a:t>
+            </a:r>
+          </a:p>
+          <a:p>
+            <a:endParaRPr lang="en-US" sz="2000" dirty="0">
+              <a:latin typeface="Source Sans Pro Light" panose="020B0403030403020204" pitchFamily="34" charset="0"/>
+              <a:ea typeface="Source Sans Pro Light" panose="020B0403030403020204" pitchFamily="34" charset="0"/>
+            </a:endParaRPr>
+          </a:p>
+          <a:p>
+            <a:r>
+              <a:rPr lang="en-US" sz="2000" dirty="0">
+                <a:latin typeface="Source Sans Pro Light" panose="020B0403030403020204" pitchFamily="34" charset="0"/>
+                <a:ea typeface="Source Sans Pro Light" panose="020B0403030403020204" pitchFamily="34" charset="0"/>
+              </a:rPr>
+              <a:t>Indeed, we can replace </a:t>
+            </a:r>
+            <a:r>
+              <a:rPr lang="en-US" sz="2000" dirty="0">
+                <a:latin typeface="Consolas" panose="020B0609020204030204" pitchFamily="49" charset="0"/>
+                <a:ea typeface="Source Sans Pro Light" panose="020B0403030403020204" pitchFamily="34" charset="0"/>
+              </a:rPr>
+              <a:t>y[</a:t>
+            </a:r>
+            <a:r>
+              <a:rPr lang="en-US" sz="2000" dirty="0" err="1">
+                <a:latin typeface="Consolas" panose="020B0609020204030204" pitchFamily="49" charset="0"/>
+                <a:ea typeface="Source Sans Pro Light" panose="020B0403030403020204" pitchFamily="34" charset="0"/>
+              </a:rPr>
+              <a:t>i</a:t>
+            </a:r>
+            <a:r>
+              <a:rPr lang="en-US" sz="2000" dirty="0">
+                <a:latin typeface="Consolas" panose="020B0609020204030204" pitchFamily="49" charset="0"/>
+                <a:ea typeface="Source Sans Pro Light" panose="020B0403030403020204" pitchFamily="34" charset="0"/>
+              </a:rPr>
+              <a:t>] ~ normal(mu, sigma);</a:t>
+            </a:r>
+            <a:r>
+              <a:rPr lang="en-US" sz="2000" dirty="0">
+                <a:latin typeface="Source Sans Pro Light" panose="020B0403030403020204" pitchFamily="34" charset="0"/>
+                <a:ea typeface="Source Sans Pro Light" panose="020B0403030403020204" pitchFamily="34" charset="0"/>
+              </a:rPr>
+              <a:t> with </a:t>
+            </a:r>
+            <a:r>
+              <a:rPr lang="en-US" sz="2000" dirty="0">
+                <a:latin typeface="Consolas" panose="020B0609020204030204" pitchFamily="49" charset="0"/>
+                <a:ea typeface="Source Sans Pro Light" panose="020B0403030403020204" pitchFamily="34" charset="0"/>
+              </a:rPr>
+              <a:t>target += </a:t>
+            </a:r>
+            <a:r>
+              <a:rPr lang="en-US" sz="2000" dirty="0" err="1">
+                <a:latin typeface="Consolas" panose="020B0609020204030204" pitchFamily="49" charset="0"/>
+                <a:ea typeface="Source Sans Pro Light" panose="020B0403030403020204" pitchFamily="34" charset="0"/>
+              </a:rPr>
+              <a:t>normal_lpdf</a:t>
+            </a:r>
+            <a:r>
+              <a:rPr lang="en-US" sz="2000" dirty="0">
+                <a:latin typeface="Consolas" panose="020B0609020204030204" pitchFamily="49" charset="0"/>
+                <a:ea typeface="Source Sans Pro Light" panose="020B0403030403020204" pitchFamily="34" charset="0"/>
+              </a:rPr>
+              <a:t>(y | mu, sigma)</a:t>
+            </a:r>
+            <a:r>
+              <a:rPr lang="en-US" sz="2000" dirty="0">
+                <a:latin typeface="Source Sans Pro Light" panose="020B0403030403020204" pitchFamily="34" charset="0"/>
+                <a:ea typeface="Source Sans Pro Light" panose="020B0403030403020204" pitchFamily="34" charset="0"/>
+              </a:rPr>
+              <a:t> .</a:t>
+            </a:r>
             <a:endParaRPr lang="en-US" sz="2000" dirty="0">
               <a:latin typeface="Consolas" panose="020B0609020204030204" pitchFamily="49" charset="0"/>
               <a:ea typeface="Source Sans Pro Light" panose="020B0403030403020204" pitchFamily="34" charset="0"/>
             </a:endParaRPr>
           </a:p>
           <a:p>
-            <a:r>
-              <a:rPr lang="en-US" sz="2000" dirty="0">
-                <a:latin typeface="Source Sans Pro Light" panose="020B0403030403020204" pitchFamily="34" charset="0"/>
-                <a:ea typeface="Source Sans Pro Light" panose="020B0403030403020204" pitchFamily="34" charset="0"/>
-              </a:rPr>
-              <a:t>This block servers a similar purpose as the </a:t>
-            </a:r>
-            <a:r>
-              <a:rPr lang="en-US" sz="2000" dirty="0">
-                <a:latin typeface="Consolas" panose="020B0609020204030204" pitchFamily="49" charset="0"/>
-                <a:ea typeface="Source Sans Pro Light" panose="020B0403030403020204" pitchFamily="34" charset="0"/>
-              </a:rPr>
-              <a:t>transformed data</a:t>
-            </a:r>
-            <a:r>
-              <a:rPr lang="en-US" sz="2000" dirty="0">
-                <a:latin typeface="Source Sans Pro Light" panose="020B0403030403020204" pitchFamily="34" charset="0"/>
-                <a:ea typeface="Source Sans Pro Light" panose="020B0403030403020204" pitchFamily="34" charset="0"/>
-              </a:rPr>
-              <a:t> block, except that this time we are transforming model’s parameters.</a:t>
-            </a:r>
-          </a:p>
-          <a:p>
-            <a:r>
-              <a:rPr lang="en-US" sz="2000" dirty="0">
-                <a:latin typeface="Source Sans Pro Light" panose="020B0403030403020204" pitchFamily="34" charset="0"/>
-                <a:ea typeface="Source Sans Pro Light" panose="020B0403030403020204" pitchFamily="34" charset="0"/>
-              </a:rPr>
-              <a:t>Transformed parameters are part of model’s output.</a:t>
-            </a:r>
-          </a:p>
-          <a:p>
-            <a:r>
-              <a:rPr lang="en-US" sz="2000" dirty="0">
-                <a:latin typeface="Source Sans Pro Light" panose="020B0403030403020204" pitchFamily="34" charset="0"/>
-                <a:ea typeface="Source Sans Pro Light" panose="020B0403030403020204" pitchFamily="34" charset="0"/>
-              </a:rPr>
-              <a:t>After statements are executed, Stan check the constraints we provided. If the parameter does not meet the constraints its value will be rejected.</a:t>
-            </a:r>
-          </a:p>
-          <a:p>
-            <a:endParaRPr lang="en-US" sz="2000" dirty="0">
-              <a:latin typeface="Consolas" panose="020B0609020204030204" pitchFamily="49" charset="0"/>
-              <a:ea typeface="Source Sans Pro Light" panose="020B0403030403020204" pitchFamily="34" charset="0"/>
-            </a:endParaRPr>
+            <a:endParaRPr lang="en-US" dirty="0"/>
           </a:p>
         </p:txBody>
       </p:sp>
@@ -12986,7 +12808,7 @@
     </p:spTree>
     <p:extLst>
       <p:ext uri="{BB962C8B-B14F-4D97-AF65-F5344CB8AC3E}">
-        <p14:creationId xmlns:p14="http://schemas.microsoft.com/office/powerpoint/2010/main" val="1103223596"/>
+        <p14:creationId xmlns:p14="http://schemas.microsoft.com/office/powerpoint/2010/main" val="2683307699"/>
       </p:ext>
     </p:extLst>
   </p:cSld>
@@ -12997,257 +12819,6 @@
 </file>
 
 <file path=ppt/slides/slide31.xml><?xml version="1.0" encoding="utf-8"?>
-<p:sld xmlns:a="http://schemas.openxmlformats.org/drawingml/2006/main" xmlns:r="http://schemas.openxmlformats.org/officeDocument/2006/relationships" xmlns:p="http://schemas.openxmlformats.org/presentationml/2006/main">
-  <p:cSld>
-    <p:spTree>
-      <p:nvGrpSpPr>
-        <p:cNvPr id="1" name=""/>
-        <p:cNvGrpSpPr/>
-        <p:nvPr/>
-      </p:nvGrpSpPr>
-      <p:grpSpPr>
-        <a:xfrm>
-          <a:off x="0" y="0"/>
-          <a:ext cx="0" cy="0"/>
-          <a:chOff x="0" y="0"/>
-          <a:chExt cx="0" cy="0"/>
-        </a:xfrm>
-      </p:grpSpPr>
-      <p:sp>
-        <p:nvSpPr>
-          <p:cNvPr id="2" name="Title 1">
-            <a:extLst>
-              <a:ext uri="{FF2B5EF4-FFF2-40B4-BE49-F238E27FC236}">
-                <a16:creationId xmlns:a16="http://schemas.microsoft.com/office/drawing/2014/main" id="{5488FAB6-27FF-4F6E-B6A3-2E4E1E84283E}"/>
-              </a:ext>
-            </a:extLst>
-          </p:cNvPr>
-          <p:cNvSpPr>
-            <a:spLocks noGrp="1"/>
-          </p:cNvSpPr>
-          <p:nvPr>
-            <p:ph type="title"/>
-          </p:nvPr>
-        </p:nvSpPr>
-        <p:spPr/>
-        <p:txBody>
-          <a:bodyPr>
-            <a:normAutofit/>
-          </a:bodyPr>
-          <a:lstStyle/>
-          <a:p>
-            <a:r>
-              <a:rPr lang="en-US" sz="2800" b="1" dirty="0">
-                <a:latin typeface="Source Sans Pro" panose="020B0503030403020204" pitchFamily="34" charset="0"/>
-                <a:ea typeface="Source Sans Pro" panose="020B0503030403020204" pitchFamily="34" charset="0"/>
-              </a:rPr>
-              <a:t>The generated quantities block</a:t>
-            </a:r>
-            <a:endParaRPr lang="LID4096" sz="2800" b="1" dirty="0">
-              <a:latin typeface="Source Sans Pro" panose="020B0503030403020204" pitchFamily="34" charset="0"/>
-              <a:ea typeface="Source Sans Pro" panose="020B0503030403020204" pitchFamily="34" charset="0"/>
-            </a:endParaRPr>
-          </a:p>
-        </p:txBody>
-      </p:sp>
-      <p:sp>
-        <p:nvSpPr>
-          <p:cNvPr id="3" name="Content Placeholder 2">
-            <a:extLst>
-              <a:ext uri="{FF2B5EF4-FFF2-40B4-BE49-F238E27FC236}">
-                <a16:creationId xmlns:a16="http://schemas.microsoft.com/office/drawing/2014/main" id="{02774E1B-7E41-4FBF-B60A-597EA771BF83}"/>
-              </a:ext>
-            </a:extLst>
-          </p:cNvPr>
-          <p:cNvSpPr>
-            <a:spLocks noGrp="1"/>
-          </p:cNvSpPr>
-          <p:nvPr>
-            <p:ph idx="1"/>
-          </p:nvPr>
-        </p:nvSpPr>
-        <p:spPr>
-          <a:xfrm>
-            <a:off x="628649" y="1521354"/>
-            <a:ext cx="7886699" cy="3626115"/>
-          </a:xfrm>
-        </p:spPr>
-        <p:txBody>
-          <a:bodyPr>
-            <a:normAutofit fontScale="92500" lnSpcReduction="10000"/>
-          </a:bodyPr>
-          <a:lstStyle/>
-          <a:p>
-            <a:pPr marL="0" indent="0">
-              <a:buNone/>
-            </a:pPr>
-            <a:r>
-              <a:rPr lang="en-US" sz="2000" dirty="0">
-                <a:latin typeface="Consolas" panose="020B0609020204030204" pitchFamily="49" charset="0"/>
-                <a:ea typeface="Source Sans Pro Light" panose="020B0403030403020204" pitchFamily="34" charset="0"/>
-              </a:rPr>
-              <a:t>generated quantities {</a:t>
-            </a:r>
-          </a:p>
-          <a:p>
-            <a:pPr marL="0" indent="0">
-              <a:buNone/>
-            </a:pPr>
-            <a:r>
-              <a:rPr lang="en-US" sz="2000" dirty="0">
-                <a:latin typeface="Consolas" panose="020B0609020204030204" pitchFamily="49" charset="0"/>
-                <a:ea typeface="Source Sans Pro Light" panose="020B0403030403020204" pitchFamily="34" charset="0"/>
-              </a:rPr>
-              <a:t>  </a:t>
-            </a:r>
-            <a:r>
-              <a:rPr lang="en-US" sz="2000" dirty="0">
-                <a:solidFill>
-                  <a:schemeClr val="bg1">
-                    <a:lumMod val="65000"/>
-                  </a:schemeClr>
-                </a:solidFill>
-                <a:latin typeface="Consolas" panose="020B0609020204030204" pitchFamily="49" charset="0"/>
-                <a:ea typeface="Source Sans Pro Light" panose="020B0403030403020204" pitchFamily="34" charset="0"/>
-              </a:rPr>
-              <a:t>// additional generated outputs</a:t>
-            </a:r>
-          </a:p>
-          <a:p>
-            <a:pPr marL="0" indent="0">
-              <a:buNone/>
-            </a:pPr>
-            <a:r>
-              <a:rPr lang="en-US" sz="2000" dirty="0">
-                <a:latin typeface="Consolas" panose="020B0609020204030204" pitchFamily="49" charset="0"/>
-                <a:ea typeface="Source Sans Pro Light" panose="020B0403030403020204" pitchFamily="34" charset="0"/>
-              </a:rPr>
-              <a:t>  ... declarations ...</a:t>
-            </a:r>
-          </a:p>
-          <a:p>
-            <a:pPr marL="0" indent="0">
-              <a:buNone/>
-            </a:pPr>
-            <a:r>
-              <a:rPr lang="en-US" sz="2000" dirty="0">
-                <a:latin typeface="Consolas" panose="020B0609020204030204" pitchFamily="49" charset="0"/>
-                <a:ea typeface="Source Sans Pro Light" panose="020B0403030403020204" pitchFamily="34" charset="0"/>
-              </a:rPr>
-              <a:t>  ... statements ...</a:t>
-            </a:r>
-          </a:p>
-          <a:p>
-            <a:pPr marL="0" indent="0">
-              <a:buNone/>
-            </a:pPr>
-            <a:r>
-              <a:rPr lang="en-US" sz="2000" dirty="0">
-                <a:latin typeface="Consolas" panose="020B0609020204030204" pitchFamily="49" charset="0"/>
-                <a:ea typeface="Source Sans Pro Light" panose="020B0403030403020204" pitchFamily="34" charset="0"/>
-              </a:rPr>
-              <a:t>}</a:t>
-            </a:r>
-          </a:p>
-          <a:p>
-            <a:pPr marL="0" indent="0">
-              <a:buNone/>
-            </a:pPr>
-            <a:endParaRPr lang="en-US" sz="2000" dirty="0">
-              <a:latin typeface="Consolas" panose="020B0609020204030204" pitchFamily="49" charset="0"/>
-              <a:ea typeface="Source Sans Pro Light" panose="020B0403030403020204" pitchFamily="34" charset="0"/>
-            </a:endParaRPr>
-          </a:p>
-          <a:p>
-            <a:r>
-              <a:rPr lang="en-US" sz="2000" dirty="0">
-                <a:latin typeface="Source Sans Pro Light" panose="020B0403030403020204" pitchFamily="34" charset="0"/>
-                <a:ea typeface="Source Sans Pro Light" panose="020B0403030403020204" pitchFamily="34" charset="0"/>
-              </a:rPr>
-              <a:t>This block is rather different then other blocks as nothing in it affects the sampled parameter values.</a:t>
-            </a:r>
-            <a:endParaRPr lang="en-US" sz="2000" dirty="0">
-              <a:latin typeface="Consolas" panose="020B0609020204030204" pitchFamily="49" charset="0"/>
-              <a:ea typeface="Source Sans Pro Light" panose="020B0403030403020204" pitchFamily="34" charset="0"/>
-            </a:endParaRPr>
-          </a:p>
-          <a:p>
-            <a:r>
-              <a:rPr lang="en-US" sz="2000" dirty="0">
-                <a:latin typeface="Source Sans Pro Light" panose="020B0403030403020204" pitchFamily="34" charset="0"/>
-                <a:ea typeface="Source Sans Pro Light" panose="020B0403030403020204" pitchFamily="34" charset="0"/>
-              </a:rPr>
-              <a:t>This block is executed after a sample is generated, in it we can use model’s variables to generate custom quantities we are interested in (e.g. posterior event probabilities, comparisons between parameters, log likelihoods ...).</a:t>
-            </a:r>
-            <a:endParaRPr lang="en-US" sz="2000" dirty="0">
-              <a:latin typeface="Consolas" panose="020B0609020204030204" pitchFamily="49" charset="0"/>
-              <a:ea typeface="Source Sans Pro Light" panose="020B0403030403020204" pitchFamily="34" charset="0"/>
-            </a:endParaRPr>
-          </a:p>
-        </p:txBody>
-      </p:sp>
-      <p:sp>
-        <p:nvSpPr>
-          <p:cNvPr id="5" name="Slide Number Placeholder 4">
-            <a:extLst>
-              <a:ext uri="{FF2B5EF4-FFF2-40B4-BE49-F238E27FC236}">
-                <a16:creationId xmlns:a16="http://schemas.microsoft.com/office/drawing/2014/main" id="{32359CFB-E8AA-4FDD-A4C4-214EF48D5737}"/>
-              </a:ext>
-            </a:extLst>
-          </p:cNvPr>
-          <p:cNvSpPr>
-            <a:spLocks noGrp="1"/>
-          </p:cNvSpPr>
-          <p:nvPr>
-            <p:ph type="sldNum" sz="quarter" idx="12"/>
-          </p:nvPr>
-        </p:nvSpPr>
-        <p:spPr>
-          <a:xfrm>
-            <a:off x="8611149" y="5216685"/>
-            <a:ext cx="532852" cy="498315"/>
-          </a:xfrm>
-        </p:spPr>
-        <p:txBody>
-          <a:bodyPr/>
-          <a:lstStyle/>
-          <a:p>
-            <a:pPr algn="ctr"/>
-            <a:fld id="{96EFF5A7-69E0-4703-97D0-8078648202E5}" type="slidenum">
-              <a:rPr lang="LID4096" sz="1600" b="1">
-                <a:solidFill>
-                  <a:srgbClr val="EF1209"/>
-                </a:solidFill>
-                <a:latin typeface="Source Sans Pro" panose="020B0503030403020204" pitchFamily="34" charset="0"/>
-                <a:ea typeface="Source Sans Pro" panose="020B0503030403020204" pitchFamily="34" charset="0"/>
-              </a:rPr>
-              <a:pPr algn="ctr"/>
-              <a:t>31</a:t>
-            </a:fld>
-            <a:endParaRPr lang="LID4096" sz="1600" b="1" dirty="0">
-              <a:solidFill>
-                <a:srgbClr val="EF1209"/>
-              </a:solidFill>
-              <a:latin typeface="Source Sans Pro" panose="020B0503030403020204" pitchFamily="34" charset="0"/>
-              <a:ea typeface="Source Sans Pro" panose="020B0503030403020204" pitchFamily="34" charset="0"/>
-            </a:endParaRPr>
-          </a:p>
-        </p:txBody>
-      </p:sp>
-    </p:spTree>
-    <p:extLst>
-      <p:ext uri="{BB962C8B-B14F-4D97-AF65-F5344CB8AC3E}">
-        <p14:creationId xmlns:p14="http://schemas.microsoft.com/office/powerpoint/2010/main" val="3700523165"/>
-      </p:ext>
-    </p:extLst>
-  </p:cSld>
-  <p:clrMapOvr>
-    <a:masterClrMapping/>
-  </p:clrMapOvr>
-</p:sld>
-</file>
-
-<file path=ppt/slides/slide32.xml><?xml version="1.0" encoding="utf-8"?>
 <p:sld xmlns:a="http://schemas.openxmlformats.org/drawingml/2006/main" xmlns:r="http://schemas.openxmlformats.org/officeDocument/2006/relationships" xmlns:p="http://schemas.openxmlformats.org/presentationml/2006/main">
   <p:cSld>
     <p:spTree>
@@ -13303,287 +12874,6 @@
       </p:pic>
       <p:sp>
         <p:nvSpPr>
-          <p:cNvPr id="2" name="Title 1">
-            <a:extLst>
-              <a:ext uri="{FF2B5EF4-FFF2-40B4-BE49-F238E27FC236}">
-                <a16:creationId xmlns:a16="http://schemas.microsoft.com/office/drawing/2014/main" id="{5488FAB6-27FF-4F6E-B6A3-2E4E1E84283E}"/>
-              </a:ext>
-            </a:extLst>
-          </p:cNvPr>
-          <p:cNvSpPr>
-            <a:spLocks noGrp="1"/>
-          </p:cNvSpPr>
-          <p:nvPr>
-            <p:ph type="title"/>
-          </p:nvPr>
-        </p:nvSpPr>
-        <p:spPr/>
-        <p:txBody>
-          <a:bodyPr>
-            <a:normAutofit/>
-          </a:bodyPr>
-          <a:lstStyle/>
-          <a:p>
-            <a:r>
-              <a:rPr lang="en-US" sz="2800" b="1" dirty="0">
-                <a:latin typeface="Source Sans Pro" panose="020B0503030403020204" pitchFamily="34" charset="0"/>
-                <a:ea typeface="Source Sans Pro" panose="020B0503030403020204" pitchFamily="34" charset="0"/>
-              </a:rPr>
-              <a:t>Log posterior probability</a:t>
-            </a:r>
-            <a:endParaRPr lang="LID4096" sz="2800" b="1" dirty="0">
-              <a:latin typeface="Source Sans Pro" panose="020B0503030403020204" pitchFamily="34" charset="0"/>
-              <a:ea typeface="Source Sans Pro" panose="020B0503030403020204" pitchFamily="34" charset="0"/>
-            </a:endParaRPr>
-          </a:p>
-        </p:txBody>
-      </p:sp>
-      <p:sp>
-        <p:nvSpPr>
-          <p:cNvPr id="3" name="Content Placeholder 2">
-            <a:extLst>
-              <a:ext uri="{FF2B5EF4-FFF2-40B4-BE49-F238E27FC236}">
-                <a16:creationId xmlns:a16="http://schemas.microsoft.com/office/drawing/2014/main" id="{02774E1B-7E41-4FBF-B60A-597EA771BF83}"/>
-              </a:ext>
-            </a:extLst>
-          </p:cNvPr>
-          <p:cNvSpPr>
-            <a:spLocks noGrp="1"/>
-          </p:cNvSpPr>
-          <p:nvPr>
-            <p:ph idx="1"/>
-          </p:nvPr>
-        </p:nvSpPr>
-        <p:spPr>
-          <a:xfrm>
-            <a:off x="628649" y="1521354"/>
-            <a:ext cx="7886699" cy="3626115"/>
-          </a:xfrm>
-        </p:spPr>
-        <p:txBody>
-          <a:bodyPr>
-            <a:normAutofit fontScale="92500" lnSpcReduction="10000"/>
-          </a:bodyPr>
-          <a:lstStyle/>
-          <a:p>
-            <a:r>
-              <a:rPr lang="en-US" sz="2000" dirty="0">
-                <a:latin typeface="Source Sans Pro Light" panose="020B0403030403020204" pitchFamily="34" charset="0"/>
-                <a:ea typeface="Source Sans Pro Light" panose="020B0403030403020204" pitchFamily="34" charset="0"/>
-              </a:rPr>
-              <a:t>In the Bayesian setting a probabilistic program is a description of how to compute the posterior distribution. The essence of computation in Stan is dealing with the logarithm of the posterior probability density.</a:t>
-            </a:r>
-          </a:p>
-          <a:p>
-            <a:endParaRPr lang="en-US" sz="2000" dirty="0">
-              <a:latin typeface="Source Sans Pro Light" panose="020B0403030403020204" pitchFamily="34" charset="0"/>
-              <a:ea typeface="Source Sans Pro Light" panose="020B0403030403020204" pitchFamily="34" charset="0"/>
-            </a:endParaRPr>
-          </a:p>
-          <a:p>
-            <a:r>
-              <a:rPr lang="en-US" sz="2000" dirty="0">
-                <a:latin typeface="Source Sans Pro Light" panose="020B0403030403020204" pitchFamily="34" charset="0"/>
-                <a:ea typeface="Source Sans Pro Light" panose="020B0403030403020204" pitchFamily="34" charset="0"/>
-              </a:rPr>
-              <a:t>In practice </a:t>
-            </a:r>
-            <a:r>
-              <a:rPr lang="en-US" sz="2000" dirty="0">
-                <a:latin typeface="Consolas" panose="020B0609020204030204" pitchFamily="49" charset="0"/>
-                <a:ea typeface="Source Sans Pro Light" panose="020B0403030403020204" pitchFamily="34" charset="0"/>
-              </a:rPr>
-              <a:t>y[</a:t>
-            </a:r>
-            <a:r>
-              <a:rPr lang="en-US" sz="2000" dirty="0" err="1">
-                <a:latin typeface="Consolas" panose="020B0609020204030204" pitchFamily="49" charset="0"/>
-                <a:ea typeface="Source Sans Pro Light" panose="020B0403030403020204" pitchFamily="34" charset="0"/>
-              </a:rPr>
-              <a:t>i</a:t>
-            </a:r>
-            <a:r>
-              <a:rPr lang="en-US" sz="2000" dirty="0">
-                <a:latin typeface="Consolas" panose="020B0609020204030204" pitchFamily="49" charset="0"/>
-                <a:ea typeface="Source Sans Pro Light" panose="020B0403030403020204" pitchFamily="34" charset="0"/>
-              </a:rPr>
-              <a:t>] ~ normal(mu, sigma);</a:t>
-            </a:r>
-            <a:r>
-              <a:rPr lang="en-US" sz="2000" dirty="0">
-                <a:latin typeface="Source Sans Pro Light" panose="020B0403030403020204" pitchFamily="34" charset="0"/>
-                <a:ea typeface="Source Sans Pro Light" panose="020B0403030403020204" pitchFamily="34" charset="0"/>
-              </a:rPr>
-              <a:t> multiplies the current posterior probability by the density of the </a:t>
-            </a:r>
-            <a:r>
-              <a:rPr lang="en-US" sz="2000" dirty="0">
-                <a:latin typeface="Consolas" panose="020B0609020204030204" pitchFamily="49" charset="0"/>
-                <a:ea typeface="Source Sans Pro Light" panose="020B0403030403020204" pitchFamily="34" charset="0"/>
-              </a:rPr>
-              <a:t>normal</a:t>
-            </a:r>
-            <a:r>
-              <a:rPr lang="en-US" sz="2000" dirty="0">
-                <a:latin typeface="Source Sans Pro Light" panose="020B0403030403020204" pitchFamily="34" charset="0"/>
-                <a:ea typeface="Source Sans Pro Light" panose="020B0403030403020204" pitchFamily="34" charset="0"/>
-              </a:rPr>
-              <a:t> distribution at </a:t>
-            </a:r>
-            <a:r>
-              <a:rPr lang="en-US" sz="2000" dirty="0">
-                <a:latin typeface="Consolas" panose="020B0609020204030204" pitchFamily="49" charset="0"/>
-                <a:ea typeface="Source Sans Pro Light" panose="020B0403030403020204" pitchFamily="34" charset="0"/>
-              </a:rPr>
-              <a:t>y[</a:t>
-            </a:r>
-            <a:r>
-              <a:rPr lang="en-US" sz="2000" dirty="0" err="1">
-                <a:latin typeface="Consolas" panose="020B0609020204030204" pitchFamily="49" charset="0"/>
-                <a:ea typeface="Source Sans Pro Light" panose="020B0403030403020204" pitchFamily="34" charset="0"/>
-              </a:rPr>
-              <a:t>i</a:t>
-            </a:r>
-            <a:r>
-              <a:rPr lang="en-US" sz="2000" dirty="0">
-                <a:latin typeface="Consolas" panose="020B0609020204030204" pitchFamily="49" charset="0"/>
-                <a:ea typeface="Source Sans Pro Light" panose="020B0403030403020204" pitchFamily="34" charset="0"/>
-              </a:rPr>
-              <a:t>]</a:t>
-            </a:r>
-            <a:r>
-              <a:rPr lang="en-US" sz="2000" dirty="0">
-                <a:latin typeface="Source Sans Pro Light" panose="020B0403030403020204" pitchFamily="34" charset="0"/>
-                <a:ea typeface="Source Sans Pro Light" panose="020B0403030403020204" pitchFamily="34" charset="0"/>
-              </a:rPr>
-              <a:t>.</a:t>
-            </a:r>
-          </a:p>
-          <a:p>
-            <a:endParaRPr lang="en-US" sz="2000" dirty="0">
-              <a:latin typeface="Source Sans Pro Light" panose="020B0403030403020204" pitchFamily="34" charset="0"/>
-              <a:ea typeface="Source Sans Pro Light" panose="020B0403030403020204" pitchFamily="34" charset="0"/>
-            </a:endParaRPr>
-          </a:p>
-          <a:p>
-            <a:r>
-              <a:rPr lang="en-US" sz="2000" dirty="0">
-                <a:latin typeface="Source Sans Pro Light" panose="020B0403030403020204" pitchFamily="34" charset="0"/>
-                <a:ea typeface="Source Sans Pro Light" panose="020B0403030403020204" pitchFamily="34" charset="0"/>
-              </a:rPr>
-              <a:t>This is the same as an increment of current log-probability by the log-density of the normal distribution at </a:t>
-            </a:r>
-            <a:r>
-              <a:rPr lang="en-US" sz="2000" dirty="0">
-                <a:latin typeface="Consolas" panose="020B0609020204030204" pitchFamily="49" charset="0"/>
-                <a:ea typeface="Source Sans Pro Light" panose="020B0403030403020204" pitchFamily="34" charset="0"/>
-              </a:rPr>
-              <a:t>y[</a:t>
-            </a:r>
-            <a:r>
-              <a:rPr lang="en-US" sz="2000" dirty="0" err="1">
-                <a:latin typeface="Consolas" panose="020B0609020204030204" pitchFamily="49" charset="0"/>
-                <a:ea typeface="Source Sans Pro Light" panose="020B0403030403020204" pitchFamily="34" charset="0"/>
-              </a:rPr>
-              <a:t>i</a:t>
-            </a:r>
-            <a:r>
-              <a:rPr lang="en-US" sz="2000" dirty="0">
-                <a:latin typeface="Consolas" panose="020B0609020204030204" pitchFamily="49" charset="0"/>
-                <a:ea typeface="Source Sans Pro Light" panose="020B0403030403020204" pitchFamily="34" charset="0"/>
-              </a:rPr>
-              <a:t>]</a:t>
-            </a:r>
-            <a:r>
-              <a:rPr lang="en-US" sz="2000" dirty="0">
-                <a:latin typeface="Source Sans Pro Light" panose="020B0403030403020204" pitchFamily="34" charset="0"/>
-                <a:ea typeface="Source Sans Pro Light" panose="020B0403030403020204" pitchFamily="34" charset="0"/>
-              </a:rPr>
-              <a:t>.</a:t>
-            </a:r>
-          </a:p>
-          <a:p>
-            <a:endParaRPr lang="en-US" sz="2000" dirty="0">
-              <a:latin typeface="Source Sans Pro Light" panose="020B0403030403020204" pitchFamily="34" charset="0"/>
-              <a:ea typeface="Source Sans Pro Light" panose="020B0403030403020204" pitchFamily="34" charset="0"/>
-            </a:endParaRPr>
-          </a:p>
-          <a:p>
-            <a:r>
-              <a:rPr lang="en-US" sz="2000" dirty="0">
-                <a:latin typeface="Source Sans Pro Light" panose="020B0403030403020204" pitchFamily="34" charset="0"/>
-                <a:ea typeface="Source Sans Pro Light" panose="020B0403030403020204" pitchFamily="34" charset="0"/>
-              </a:rPr>
-              <a:t>Indeed, we can replace </a:t>
-            </a:r>
-            <a:r>
-              <a:rPr lang="en-US" sz="2000" dirty="0">
-                <a:latin typeface="Consolas" panose="020B0609020204030204" pitchFamily="49" charset="0"/>
-                <a:ea typeface="Source Sans Pro Light" panose="020B0403030403020204" pitchFamily="34" charset="0"/>
-              </a:rPr>
-              <a:t>y[</a:t>
-            </a:r>
-            <a:r>
-              <a:rPr lang="en-US" sz="2000" dirty="0" err="1">
-                <a:latin typeface="Consolas" panose="020B0609020204030204" pitchFamily="49" charset="0"/>
-                <a:ea typeface="Source Sans Pro Light" panose="020B0403030403020204" pitchFamily="34" charset="0"/>
-              </a:rPr>
-              <a:t>i</a:t>
-            </a:r>
-            <a:r>
-              <a:rPr lang="en-US" sz="2000" dirty="0">
-                <a:latin typeface="Consolas" panose="020B0609020204030204" pitchFamily="49" charset="0"/>
-                <a:ea typeface="Source Sans Pro Light" panose="020B0403030403020204" pitchFamily="34" charset="0"/>
-              </a:rPr>
-              <a:t>] ~ normal(mu, sigma);</a:t>
-            </a:r>
-            <a:r>
-              <a:rPr lang="en-US" sz="2000" dirty="0">
-                <a:latin typeface="Source Sans Pro Light" panose="020B0403030403020204" pitchFamily="34" charset="0"/>
-                <a:ea typeface="Source Sans Pro Light" panose="020B0403030403020204" pitchFamily="34" charset="0"/>
-              </a:rPr>
-              <a:t> with </a:t>
-            </a:r>
-            <a:r>
-              <a:rPr lang="en-US" sz="2000" dirty="0">
-                <a:latin typeface="Consolas" panose="020B0609020204030204" pitchFamily="49" charset="0"/>
-                <a:ea typeface="Source Sans Pro Light" panose="020B0403030403020204" pitchFamily="34" charset="0"/>
-              </a:rPr>
-              <a:t>target += </a:t>
-            </a:r>
-            <a:r>
-              <a:rPr lang="en-US" sz="2000" dirty="0" err="1">
-                <a:latin typeface="Consolas" panose="020B0609020204030204" pitchFamily="49" charset="0"/>
-                <a:ea typeface="Source Sans Pro Light" panose="020B0403030403020204" pitchFamily="34" charset="0"/>
-              </a:rPr>
-              <a:t>normal_lpdf</a:t>
-            </a:r>
-            <a:r>
-              <a:rPr lang="en-US" sz="2000" dirty="0">
-                <a:latin typeface="Consolas" panose="020B0609020204030204" pitchFamily="49" charset="0"/>
-                <a:ea typeface="Source Sans Pro Light" panose="020B0403030403020204" pitchFamily="34" charset="0"/>
-              </a:rPr>
-              <a:t>(y | mu, sigma)</a:t>
-            </a:r>
-            <a:r>
-              <a:rPr lang="en-US" sz="2000" dirty="0">
-                <a:latin typeface="Source Sans Pro Light" panose="020B0403030403020204" pitchFamily="34" charset="0"/>
-                <a:ea typeface="Source Sans Pro Light" panose="020B0403030403020204" pitchFamily="34" charset="0"/>
-              </a:rPr>
-              <a:t> .</a:t>
-            </a:r>
-            <a:endParaRPr lang="en-US" sz="2000" dirty="0">
-              <a:latin typeface="Consolas" panose="020B0609020204030204" pitchFamily="49" charset="0"/>
-              <a:ea typeface="Source Sans Pro Light" panose="020B0403030403020204" pitchFamily="34" charset="0"/>
-            </a:endParaRPr>
-          </a:p>
-          <a:p>
-            <a:endParaRPr lang="en-US" dirty="0"/>
-          </a:p>
-        </p:txBody>
-      </p:sp>
-      <p:sp>
-        <p:nvSpPr>
           <p:cNvPr id="5" name="Slide Number Placeholder 4">
             <a:extLst>
               <a:ext uri="{FF2B5EF4-FFF2-40B4-BE49-F238E27FC236}">
@@ -13618,7 +12908,7 @@
                 <a:ea typeface="Source Sans Pro" panose="020B0503030403020204" pitchFamily="34" charset="0"/>
               </a:rPr>
               <a:pPr algn="ctr"/>
-              <a:t>32</a:t>
+              <a:t>31</a:t>
             </a:fld>
             <a:endParaRPr lang="LID4096" sz="1600" b="1" dirty="0">
               <a:solidFill>
@@ -13630,10 +12920,71 @@
           </a:p>
         </p:txBody>
       </p:sp>
+      <p:sp>
+        <p:nvSpPr>
+          <p:cNvPr id="10" name="Title 1">
+            <a:extLst>
+              <a:ext uri="{FF2B5EF4-FFF2-40B4-BE49-F238E27FC236}">
+                <a16:creationId xmlns:a16="http://schemas.microsoft.com/office/drawing/2014/main" id="{3B37C8E1-518D-4B8F-8EA7-56BAD539FFF7}"/>
+              </a:ext>
+            </a:extLst>
+          </p:cNvPr>
+          <p:cNvSpPr txBox="1">
+            <a:spLocks/>
+          </p:cNvSpPr>
+          <p:nvPr/>
+        </p:nvSpPr>
+        <p:spPr>
+          <a:xfrm>
+            <a:off x="2765400" y="2307070"/>
+            <a:ext cx="3613197" cy="1100859"/>
+          </a:xfrm>
+          <a:prstGeom prst="rect">
+            <a:avLst/>
+          </a:prstGeom>
+        </p:spPr>
+        <p:txBody>
+          <a:bodyPr vert="horz" lIns="91440" tIns="45720" rIns="91440" bIns="45720" rtlCol="0" anchor="ctr">
+            <a:normAutofit fontScale="97500"/>
+          </a:bodyPr>
+          <a:lstStyle>
+            <a:lvl1pPr algn="l" defTabSz="685800" rtl="0" eaLnBrk="1" latinLnBrk="0" hangingPunct="1">
+              <a:lnSpc>
+                <a:spcPct val="90000"/>
+              </a:lnSpc>
+              <a:spcBef>
+                <a:spcPct val="0"/>
+              </a:spcBef>
+              <a:buNone/>
+              <a:defRPr sz="3300" kern="1200">
+                <a:solidFill>
+                  <a:schemeClr val="tx1"/>
+                </a:solidFill>
+                <a:latin typeface="+mj-lt"/>
+                <a:ea typeface="+mj-ea"/>
+                <a:cs typeface="+mj-cs"/>
+              </a:defRPr>
+            </a:lvl1pPr>
+          </a:lstStyle>
+          <a:p>
+            <a:r>
+              <a:rPr lang="en-US" sz="3200" b="1" dirty="0">
+                <a:latin typeface="Source Sans Pro" panose="020B0503030403020204" pitchFamily="34" charset="0"/>
+                <a:ea typeface="Source Sans Pro" panose="020B0503030403020204" pitchFamily="34" charset="0"/>
+              </a:rPr>
+              <a:t>Hands on examples</a:t>
+            </a:r>
+            <a:endParaRPr lang="LID4096" sz="5400" b="1" dirty="0">
+              <a:latin typeface="Source Sans Pro" panose="020B0503030403020204" pitchFamily="34" charset="0"/>
+              <a:ea typeface="Source Sans Pro" panose="020B0503030403020204" pitchFamily="34" charset="0"/>
+            </a:endParaRPr>
+          </a:p>
+        </p:txBody>
+      </p:sp>
     </p:spTree>
     <p:extLst>
       <p:ext uri="{BB962C8B-B14F-4D97-AF65-F5344CB8AC3E}">
-        <p14:creationId xmlns:p14="http://schemas.microsoft.com/office/powerpoint/2010/main" val="2683307699"/>
+        <p14:creationId xmlns:p14="http://schemas.microsoft.com/office/powerpoint/2010/main" val="1894891606"/>
       </p:ext>
     </p:extLst>
   </p:cSld>
@@ -13643,7 +12994,7 @@
 </p:sld>
 </file>
 
-<file path=ppt/slides/slide33.xml><?xml version="1.0" encoding="utf-8"?>
+<file path=ppt/slides/slide32.xml><?xml version="1.0" encoding="utf-8"?>
 <p:sld xmlns:a="http://schemas.openxmlformats.org/drawingml/2006/main" xmlns:r="http://schemas.openxmlformats.org/officeDocument/2006/relationships" xmlns:p="http://schemas.openxmlformats.org/presentationml/2006/main">
   <p:cSld>
     <p:spTree>
@@ -13660,43 +13011,43 @@
           <a:chExt cx="0" cy="0"/>
         </a:xfrm>
       </p:grpSpPr>
-      <p:pic>
-        <p:nvPicPr>
-          <p:cNvPr id="4" name="Picture 3" descr="Logo, company name&#10;&#10;Description automatically generated">
+      <p:sp>
+        <p:nvSpPr>
+          <p:cNvPr id="2" name="Title 1">
             <a:extLst>
               <a:ext uri="{FF2B5EF4-FFF2-40B4-BE49-F238E27FC236}">
-                <a16:creationId xmlns:a16="http://schemas.microsoft.com/office/drawing/2014/main" id="{B843C928-BA92-4E3B-A771-AAED350D87B3}"/>
+                <a16:creationId xmlns:a16="http://schemas.microsoft.com/office/drawing/2014/main" id="{5488FAB6-27FF-4F6E-B6A3-2E4E1E84283E}"/>
               </a:ext>
             </a:extLst>
           </p:cNvPr>
-          <p:cNvPicPr>
-            <a:picLocks noChangeAspect="1"/>
-          </p:cNvPicPr>
-          <p:nvPr/>
-        </p:nvPicPr>
-        <p:blipFill>
-          <a:blip r:embed="rId3">
-            <a:alphaModFix amt="5000"/>
-            <a:extLst>
-              <a:ext uri="{28A0092B-C50C-407E-A947-70E740481C1C}">
-                <a14:useLocalDpi xmlns:a14="http://schemas.microsoft.com/office/drawing/2010/main" val="0"/>
-              </a:ext>
-            </a:extLst>
-          </a:blip>
-          <a:stretch>
-            <a:fillRect/>
-          </a:stretch>
-        </p:blipFill>
-        <p:spPr>
-          <a:xfrm>
-            <a:off x="2030642" y="309365"/>
-            <a:ext cx="5082715" cy="5096270"/>
-          </a:xfrm>
-          <a:prstGeom prst="rect">
-            <a:avLst/>
-          </a:prstGeom>
-        </p:spPr>
-      </p:pic>
+          <p:cNvSpPr>
+            <a:spLocks noGrp="1"/>
+          </p:cNvSpPr>
+          <p:nvPr>
+            <p:ph type="title"/>
+          </p:nvPr>
+        </p:nvSpPr>
+        <p:spPr/>
+        <p:txBody>
+          <a:bodyPr>
+            <a:normAutofit/>
+          </a:bodyPr>
+          <a:lstStyle/>
+          <a:p>
+            <a:r>
+              <a:rPr lang="en-US" sz="2800" b="1" dirty="0">
+                <a:latin typeface="Source Sans Pro" panose="020B0503030403020204" pitchFamily="34" charset="0"/>
+                <a:ea typeface="Source Sans Pro" panose="020B0503030403020204" pitchFamily="34" charset="0"/>
+              </a:rPr>
+              <a:t>Presenting models</a:t>
+            </a:r>
+            <a:endParaRPr lang="LID4096" sz="2800" b="1" dirty="0">
+              <a:latin typeface="Source Sans Pro" panose="020B0503030403020204" pitchFamily="34" charset="0"/>
+              <a:ea typeface="Source Sans Pro" panose="020B0503030403020204" pitchFamily="34" charset="0"/>
+            </a:endParaRPr>
+          </a:p>
+        </p:txBody>
+      </p:sp>
       <p:sp>
         <p:nvSpPr>
           <p:cNvPr id="5" name="Slide Number Placeholder 4">
@@ -13733,183 +13084,7 @@
                 <a:ea typeface="Source Sans Pro" panose="020B0503030403020204" pitchFamily="34" charset="0"/>
               </a:rPr>
               <a:pPr algn="ctr"/>
-              <a:t>33</a:t>
-            </a:fld>
-            <a:endParaRPr lang="LID4096" sz="1600" b="1" dirty="0">
-              <a:solidFill>
-                <a:srgbClr val="EF1209"/>
-              </a:solidFill>
-              <a:latin typeface="Source Sans Pro" panose="020B0503030403020204" pitchFamily="34" charset="0"/>
-              <a:ea typeface="Source Sans Pro" panose="020B0503030403020204" pitchFamily="34" charset="0"/>
-            </a:endParaRPr>
-          </a:p>
-        </p:txBody>
-      </p:sp>
-      <p:sp>
-        <p:nvSpPr>
-          <p:cNvPr id="10" name="Title 1">
-            <a:extLst>
-              <a:ext uri="{FF2B5EF4-FFF2-40B4-BE49-F238E27FC236}">
-                <a16:creationId xmlns:a16="http://schemas.microsoft.com/office/drawing/2014/main" id="{3B37C8E1-518D-4B8F-8EA7-56BAD539FFF7}"/>
-              </a:ext>
-            </a:extLst>
-          </p:cNvPr>
-          <p:cNvSpPr txBox="1">
-            <a:spLocks/>
-          </p:cNvSpPr>
-          <p:nvPr/>
-        </p:nvSpPr>
-        <p:spPr>
-          <a:xfrm>
-            <a:off x="2765400" y="2307070"/>
-            <a:ext cx="3613197" cy="1100859"/>
-          </a:xfrm>
-          <a:prstGeom prst="rect">
-            <a:avLst/>
-          </a:prstGeom>
-        </p:spPr>
-        <p:txBody>
-          <a:bodyPr vert="horz" lIns="91440" tIns="45720" rIns="91440" bIns="45720" rtlCol="0" anchor="ctr">
-            <a:normAutofit fontScale="97500"/>
-          </a:bodyPr>
-          <a:lstStyle>
-            <a:lvl1pPr algn="l" defTabSz="685800" rtl="0" eaLnBrk="1" latinLnBrk="0" hangingPunct="1">
-              <a:lnSpc>
-                <a:spcPct val="90000"/>
-              </a:lnSpc>
-              <a:spcBef>
-                <a:spcPct val="0"/>
-              </a:spcBef>
-              <a:buNone/>
-              <a:defRPr sz="3300" kern="1200">
-                <a:solidFill>
-                  <a:schemeClr val="tx1"/>
-                </a:solidFill>
-                <a:latin typeface="+mj-lt"/>
-                <a:ea typeface="+mj-ea"/>
-                <a:cs typeface="+mj-cs"/>
-              </a:defRPr>
-            </a:lvl1pPr>
-          </a:lstStyle>
-          <a:p>
-            <a:r>
-              <a:rPr lang="en-US" sz="3200" b="1" dirty="0">
-                <a:latin typeface="Source Sans Pro" panose="020B0503030403020204" pitchFamily="34" charset="0"/>
-                <a:ea typeface="Source Sans Pro" panose="020B0503030403020204" pitchFamily="34" charset="0"/>
-              </a:rPr>
-              <a:t>Hands on examples</a:t>
-            </a:r>
-            <a:endParaRPr lang="LID4096" sz="5400" b="1" dirty="0">
-              <a:latin typeface="Source Sans Pro" panose="020B0503030403020204" pitchFamily="34" charset="0"/>
-              <a:ea typeface="Source Sans Pro" panose="020B0503030403020204" pitchFamily="34" charset="0"/>
-            </a:endParaRPr>
-          </a:p>
-        </p:txBody>
-      </p:sp>
-    </p:spTree>
-    <p:extLst>
-      <p:ext uri="{BB962C8B-B14F-4D97-AF65-F5344CB8AC3E}">
-        <p14:creationId xmlns:p14="http://schemas.microsoft.com/office/powerpoint/2010/main" val="1894891606"/>
-      </p:ext>
-    </p:extLst>
-  </p:cSld>
-  <p:clrMapOvr>
-    <a:masterClrMapping/>
-  </p:clrMapOvr>
-</p:sld>
-</file>
-
-<file path=ppt/slides/slide34.xml><?xml version="1.0" encoding="utf-8"?>
-<p:sld xmlns:a="http://schemas.openxmlformats.org/drawingml/2006/main" xmlns:r="http://schemas.openxmlformats.org/officeDocument/2006/relationships" xmlns:p="http://schemas.openxmlformats.org/presentationml/2006/main">
-  <p:cSld>
-    <p:spTree>
-      <p:nvGrpSpPr>
-        <p:cNvPr id="1" name=""/>
-        <p:cNvGrpSpPr/>
-        <p:nvPr/>
-      </p:nvGrpSpPr>
-      <p:grpSpPr>
-        <a:xfrm>
-          <a:off x="0" y="0"/>
-          <a:ext cx="0" cy="0"/>
-          <a:chOff x="0" y="0"/>
-          <a:chExt cx="0" cy="0"/>
-        </a:xfrm>
-      </p:grpSpPr>
-      <p:sp>
-        <p:nvSpPr>
-          <p:cNvPr id="2" name="Title 1">
-            <a:extLst>
-              <a:ext uri="{FF2B5EF4-FFF2-40B4-BE49-F238E27FC236}">
-                <a16:creationId xmlns:a16="http://schemas.microsoft.com/office/drawing/2014/main" id="{5488FAB6-27FF-4F6E-B6A3-2E4E1E84283E}"/>
-              </a:ext>
-            </a:extLst>
-          </p:cNvPr>
-          <p:cNvSpPr>
-            <a:spLocks noGrp="1"/>
-          </p:cNvSpPr>
-          <p:nvPr>
-            <p:ph type="title"/>
-          </p:nvPr>
-        </p:nvSpPr>
-        <p:spPr/>
-        <p:txBody>
-          <a:bodyPr>
-            <a:normAutofit/>
-          </a:bodyPr>
-          <a:lstStyle/>
-          <a:p>
-            <a:r>
-              <a:rPr lang="en-US" sz="2800" b="1" dirty="0">
-                <a:latin typeface="Source Sans Pro" panose="020B0503030403020204" pitchFamily="34" charset="0"/>
-                <a:ea typeface="Source Sans Pro" panose="020B0503030403020204" pitchFamily="34" charset="0"/>
-              </a:rPr>
-              <a:t>Presenting models</a:t>
-            </a:r>
-            <a:endParaRPr lang="LID4096" sz="2800" b="1" dirty="0">
-              <a:latin typeface="Source Sans Pro" panose="020B0503030403020204" pitchFamily="34" charset="0"/>
-              <a:ea typeface="Source Sans Pro" panose="020B0503030403020204" pitchFamily="34" charset="0"/>
-            </a:endParaRPr>
-          </a:p>
-        </p:txBody>
-      </p:sp>
-      <p:sp>
-        <p:nvSpPr>
-          <p:cNvPr id="5" name="Slide Number Placeholder 4">
-            <a:extLst>
-              <a:ext uri="{FF2B5EF4-FFF2-40B4-BE49-F238E27FC236}">
-                <a16:creationId xmlns:a16="http://schemas.microsoft.com/office/drawing/2014/main" id="{32359CFB-E8AA-4FDD-A4C4-214EF48D5737}"/>
-              </a:ext>
-            </a:extLst>
-          </p:cNvPr>
-          <p:cNvSpPr>
-            <a:spLocks noGrp="1"/>
-          </p:cNvSpPr>
-          <p:nvPr>
-            <p:ph type="sldNum" sz="quarter" idx="12"/>
-          </p:nvPr>
-        </p:nvSpPr>
-        <p:spPr>
-          <a:xfrm>
-            <a:off x="8611149" y="5216685"/>
-            <a:ext cx="532852" cy="498315"/>
-          </a:xfrm>
-        </p:spPr>
-        <p:txBody>
-          <a:bodyPr/>
-          <a:lstStyle/>
-          <a:p>
-            <a:pPr algn="ctr"/>
-            <a:fld id="{96EFF5A7-69E0-4703-97D0-8078648202E5}" type="slidenum">
-              <a:rPr lang="LID4096" sz="1600" b="1">
-                <a:solidFill>
-                  <a:srgbClr val="EF1209"/>
-                </a:solidFill>
-                <a:latin typeface="Source Sans Pro" panose="020B0503030403020204" pitchFamily="34" charset="0"/>
-                <a:ea typeface="Source Sans Pro" panose="020B0503030403020204" pitchFamily="34" charset="0"/>
-              </a:rPr>
-              <a:pPr algn="ctr"/>
-              <a:t>34</a:t>
+              <a:t>32</a:t>
             </a:fld>
             <a:endParaRPr lang="LID4096" sz="1600" b="1" dirty="0">
               <a:solidFill>
@@ -13964,7 +13139,7 @@
 </p:sld>
 </file>
 
-<file path=ppt/slides/slide35.xml><?xml version="1.0" encoding="utf-8"?>
+<file path=ppt/slides/slide33.xml><?xml version="1.0" encoding="utf-8"?>
 <p:sld xmlns:a="http://schemas.openxmlformats.org/drawingml/2006/main" xmlns:r="http://schemas.openxmlformats.org/officeDocument/2006/relationships" xmlns:p="http://schemas.openxmlformats.org/presentationml/2006/main">
   <p:cSld>
     <p:spTree>
@@ -14017,7 +13192,7 @@
                 <a:ea typeface="Source Sans Pro" panose="020B0503030403020204" pitchFamily="34" charset="0"/>
               </a:rPr>
               <a:pPr algn="ctr"/>
-              <a:t>35</a:t>
+              <a:t>33</a:t>
             </a:fld>
             <a:endParaRPr lang="LID4096" sz="1600" b="1" dirty="0">
               <a:solidFill>
@@ -14078,7 +13253,7 @@
 </p:sld>
 </file>
 
-<file path=ppt/slides/slide36.xml><?xml version="1.0" encoding="utf-8"?>
+<file path=ppt/slides/slide34.xml><?xml version="1.0" encoding="utf-8"?>
 <p:sld xmlns:a="http://schemas.openxmlformats.org/drawingml/2006/main" xmlns:r="http://schemas.openxmlformats.org/officeDocument/2006/relationships" xmlns:p="http://schemas.openxmlformats.org/presentationml/2006/main">
   <p:cSld>
     <p:spTree>

</xml_diff>

<commit_message>
Some minor tweaks to week 3 content.
</commit_message>
<xml_diff>
--- a/Session_03_Probabilistic_programming/Probabilistic_programming.pptx
+++ b/Session_03_Probabilistic_programming/Probabilistic_programming.pptx
@@ -1756,7 +1756,7 @@
           <a:p>
             <a:fld id="{43E8DC33-9320-4328-B019-E0163181A3C7}" type="datetimeFigureOut">
               <a:rPr lang="LID4096" smtClean="0"/>
-              <a:t>10/12/21</a:t>
+              <a:t>10/21/21</a:t>
             </a:fld>
             <a:endParaRPr lang="LID4096"/>
           </a:p>
@@ -2753,7 +2753,7 @@
           <a:p>
             <a:fld id="{DF77F8B7-67C5-4A34-9D89-4D3855478B38}" type="datetime1">
               <a:rPr lang="LID4096" smtClean="0"/>
-              <a:t>10/12/21</a:t>
+              <a:t>10/21/21</a:t>
             </a:fld>
             <a:endParaRPr lang="LID4096"/>
           </a:p>
@@ -2923,7 +2923,7 @@
           <a:p>
             <a:fld id="{2E01C644-7963-4809-9FF7-F9DF3305E547}" type="datetime1">
               <a:rPr lang="LID4096" smtClean="0"/>
-              <a:t>10/12/21</a:t>
+              <a:t>10/21/21</a:t>
             </a:fld>
             <a:endParaRPr lang="LID4096"/>
           </a:p>
@@ -3103,7 +3103,7 @@
           <a:p>
             <a:fld id="{B04ECBB3-0644-4928-A7BE-41D4F8638333}" type="datetime1">
               <a:rPr lang="LID4096" smtClean="0"/>
-              <a:t>10/12/21</a:t>
+              <a:t>10/21/21</a:t>
             </a:fld>
             <a:endParaRPr lang="LID4096"/>
           </a:p>
@@ -3273,7 +3273,7 @@
           <a:p>
             <a:fld id="{1E35827A-731F-4B00-B107-0A188EC60DAC}" type="datetime1">
               <a:rPr lang="LID4096" smtClean="0"/>
-              <a:t>10/12/21</a:t>
+              <a:t>10/21/21</a:t>
             </a:fld>
             <a:endParaRPr lang="LID4096"/>
           </a:p>
@@ -3519,7 +3519,7 @@
           <a:p>
             <a:fld id="{D8E46D72-F593-4B40-B106-3EC660BC654E}" type="datetime1">
               <a:rPr lang="LID4096" smtClean="0"/>
-              <a:t>10/12/21</a:t>
+              <a:t>10/21/21</a:t>
             </a:fld>
             <a:endParaRPr lang="LID4096"/>
           </a:p>
@@ -3751,7 +3751,7 @@
           <a:p>
             <a:fld id="{5D9F6076-8E4C-42D8-AF17-F97426B5A340}" type="datetime1">
               <a:rPr lang="LID4096" smtClean="0"/>
-              <a:t>10/12/21</a:t>
+              <a:t>10/21/21</a:t>
             </a:fld>
             <a:endParaRPr lang="LID4096"/>
           </a:p>
@@ -4118,7 +4118,7 @@
           <a:p>
             <a:fld id="{CD567D47-60FF-4C64-862B-023FFBAD268A}" type="datetime1">
               <a:rPr lang="LID4096" smtClean="0"/>
-              <a:t>10/12/21</a:t>
+              <a:t>10/21/21</a:t>
             </a:fld>
             <a:endParaRPr lang="LID4096"/>
           </a:p>
@@ -4236,7 +4236,7 @@
           <a:p>
             <a:fld id="{EFEF1EEE-FEBE-4D06-A0A4-D3C86B39934D}" type="datetime1">
               <a:rPr lang="LID4096" smtClean="0"/>
-              <a:t>10/12/21</a:t>
+              <a:t>10/21/21</a:t>
             </a:fld>
             <a:endParaRPr lang="LID4096"/>
           </a:p>
@@ -4331,7 +4331,7 @@
           <a:p>
             <a:fld id="{EACC84AE-54D1-4B7D-8A6B-EF7CB9635BE3}" type="datetime1">
               <a:rPr lang="LID4096" smtClean="0"/>
-              <a:t>10/12/21</a:t>
+              <a:t>10/21/21</a:t>
             </a:fld>
             <a:endParaRPr lang="LID4096"/>
           </a:p>
@@ -4608,7 +4608,7 @@
           <a:p>
             <a:fld id="{B227948E-2D54-4984-8A4B-70C1CA7F957B}" type="datetime1">
               <a:rPr lang="LID4096" smtClean="0"/>
-              <a:t>10/12/21</a:t>
+              <a:t>10/21/21</a:t>
             </a:fld>
             <a:endParaRPr lang="LID4096"/>
           </a:p>
@@ -4865,7 +4865,7 @@
           <a:p>
             <a:fld id="{378B6861-8171-4936-A2D2-42381F04264D}" type="datetime1">
               <a:rPr lang="LID4096" smtClean="0"/>
-              <a:t>10/12/21</a:t>
+              <a:t>10/21/21</a:t>
             </a:fld>
             <a:endParaRPr lang="LID4096"/>
           </a:p>
@@ -5078,7 +5078,7 @@
           <a:p>
             <a:fld id="{6D1357CB-971F-4825-B9C7-A50F10DC2193}" type="datetime1">
               <a:rPr lang="LID4096" smtClean="0"/>
-              <a:t>10/12/21</a:t>
+              <a:t>10/21/21</a:t>
             </a:fld>
             <a:endParaRPr lang="LID4096"/>
           </a:p>
@@ -5720,7 +5720,7 @@
           <a:graphicData uri="http://schemas.openxmlformats.org/presentationml/2006/ole">
             <mc:AlternateContent xmlns:mc="http://schemas.openxmlformats.org/markup-compatibility/2006">
               <mc:Choice xmlns:v="urn:schemas-microsoft-com:vml" Requires="v">
-                <p:oleObj spid="_x0000_s1034" r:id="rId3" imgW="6984000" imgH="6323760" progId="">
+                <p:oleObj spid="_x0000_s1042" r:id="rId3" imgW="6984000" imgH="6323760" progId="">
                   <p:embed/>
                 </p:oleObj>
               </mc:Choice>
@@ -5789,7 +5789,7 @@
           <a:graphicData uri="http://schemas.openxmlformats.org/presentationml/2006/ole">
             <mc:AlternateContent xmlns:mc="http://schemas.openxmlformats.org/markup-compatibility/2006">
               <mc:Choice xmlns:v="urn:schemas-microsoft-com:vml" Requires="v">
-                <p:oleObj spid="_x0000_s1035" r:id="rId5" imgW="6984000" imgH="6323760" progId="">
+                <p:oleObj spid="_x0000_s1043" r:id="rId5" imgW="6984000" imgH="6323760" progId="">
                   <p:embed/>
                 </p:oleObj>
               </mc:Choice>
@@ -9299,7 +9299,7 @@
                 <a:latin typeface="Consolas" panose="020B0609020204030204" pitchFamily="49" charset="0"/>
                 <a:ea typeface="Source Sans Pro Light" panose="020B0403030403020204" pitchFamily="34" charset="0"/>
               </a:rPr>
-              <a:t>[3] Sigma;</a:t>
+              <a:t>[K] Sigma;</a:t>
             </a:r>
           </a:p>
         </p:txBody>
@@ -9511,7 +9511,7 @@
                 <a:latin typeface="Consolas" panose="020B0609020204030204" pitchFamily="49" charset="0"/>
                 <a:ea typeface="Source Sans Pro Light" panose="020B0403030403020204" pitchFamily="34" charset="0"/>
               </a:rPr>
-              <a:t>[4] L;</a:t>
+              <a:t>[K] L;</a:t>
             </a:r>
           </a:p>
           <a:p>
@@ -9749,21 +9749,19 @@
                 <a:latin typeface="Consolas" panose="020B0609020204030204" pitchFamily="49" charset="0"/>
                 <a:ea typeface="Source Sans Pro Light" panose="020B0403030403020204" pitchFamily="34" charset="0"/>
               </a:rPr>
-              <a:t>if (</a:t>
-            </a:r>
-            <a:r>
-              <a:rPr lang="en-US" sz="1600" dirty="0" err="1">
-                <a:latin typeface="Consolas" panose="020B0609020204030204" pitchFamily="49" charset="0"/>
-                <a:ea typeface="Source Sans Pro Light" panose="020B0403030403020204" pitchFamily="34" charset="0"/>
-              </a:rPr>
-              <a:t>condition1</a:t>
-            </a:r>
+              <a:t>if (condition1) {</a:t>
+            </a:r>
+          </a:p>
+          <a:p>
+            <a:pPr marL="0" indent="0">
+              <a:buNone/>
+            </a:pPr>
             <a:r>
               <a:rPr lang="en-US" sz="1600" dirty="0">
                 <a:latin typeface="Consolas" panose="020B0609020204030204" pitchFamily="49" charset="0"/>
                 <a:ea typeface="Source Sans Pro Light" panose="020B0403030403020204" pitchFamily="34" charset="0"/>
               </a:rPr>
-              <a:t>)</a:t>
+              <a:t>  statements</a:t>
             </a:r>
           </a:p>
           <a:p>
@@ -9775,68 +9773,8 @@
                 <a:latin typeface="Consolas" panose="020B0609020204030204" pitchFamily="49" charset="0"/>
                 <a:ea typeface="Source Sans Pro Light" panose="020B0403030403020204" pitchFamily="34" charset="0"/>
               </a:rPr>
-              <a:t>  </a:t>
-            </a:r>
-            <a:r>
-              <a:rPr lang="en-US" sz="1600" dirty="0" err="1">
-                <a:latin typeface="Consolas" panose="020B0609020204030204" pitchFamily="49" charset="0"/>
-                <a:ea typeface="Source Sans Pro Light" panose="020B0403030403020204" pitchFamily="34" charset="0"/>
-              </a:rPr>
-              <a:t>statement1</a:t>
-            </a:r>
-            <a:endParaRPr lang="en-US" sz="1600" dirty="0">
-              <a:latin typeface="Consolas" panose="020B0609020204030204" pitchFamily="49" charset="0"/>
-              <a:ea typeface="Source Sans Pro Light" panose="020B0403030403020204" pitchFamily="34" charset="0"/>
-            </a:endParaRPr>
-          </a:p>
-          <a:p>
-            <a:pPr marL="0" indent="0">
-              <a:buNone/>
-            </a:pPr>
-            <a:r>
-              <a:rPr lang="en-US" sz="1600" dirty="0">
-                <a:latin typeface="Consolas" panose="020B0609020204030204" pitchFamily="49" charset="0"/>
-                <a:ea typeface="Source Sans Pro Light" panose="020B0403030403020204" pitchFamily="34" charset="0"/>
-              </a:rPr>
-              <a:t>else if (</a:t>
-            </a:r>
-            <a:r>
-              <a:rPr lang="en-US" sz="1600" dirty="0" err="1">
-                <a:latin typeface="Consolas" panose="020B0609020204030204" pitchFamily="49" charset="0"/>
-                <a:ea typeface="Source Sans Pro Light" panose="020B0403030403020204" pitchFamily="34" charset="0"/>
-              </a:rPr>
-              <a:t>condition2</a:t>
-            </a:r>
-            <a:r>
-              <a:rPr lang="en-US" sz="1600" dirty="0">
-                <a:latin typeface="Consolas" panose="020B0609020204030204" pitchFamily="49" charset="0"/>
-                <a:ea typeface="Source Sans Pro Light" panose="020B0403030403020204" pitchFamily="34" charset="0"/>
-              </a:rPr>
-              <a:t>)</a:t>
-            </a:r>
-          </a:p>
-          <a:p>
-            <a:pPr marL="0" indent="0">
-              <a:buNone/>
-            </a:pPr>
-            <a:r>
-              <a:rPr lang="en-US" sz="1600" dirty="0">
-                <a:latin typeface="Consolas" panose="020B0609020204030204" pitchFamily="49" charset="0"/>
-                <a:ea typeface="Source Sans Pro Light" panose="020B0403030403020204" pitchFamily="34" charset="0"/>
-              </a:rPr>
-              <a:t>  </a:t>
-            </a:r>
-            <a:r>
-              <a:rPr lang="en-US" sz="1600" dirty="0" err="1">
-                <a:latin typeface="Consolas" panose="020B0609020204030204" pitchFamily="49" charset="0"/>
-                <a:ea typeface="Source Sans Pro Light" panose="020B0403030403020204" pitchFamily="34" charset="0"/>
-              </a:rPr>
-              <a:t>statement2</a:t>
-            </a:r>
-            <a:endParaRPr lang="en-US" sz="1600" dirty="0">
-              <a:latin typeface="Consolas" panose="020B0609020204030204" pitchFamily="49" charset="0"/>
-              <a:ea typeface="Source Sans Pro Light" panose="020B0403030403020204" pitchFamily="34" charset="0"/>
-            </a:endParaRPr>
+              <a:t>}</a:t>
+            </a:r>
           </a:p>
           <a:p>
             <a:pPr marL="0" indent="0">
@@ -9854,6 +9792,10 @@
               </a:rPr>
               <a:t>// a comment</a:t>
             </a:r>
+            <a:endParaRPr lang="en-US" sz="1600" dirty="0">
+              <a:latin typeface="Consolas" panose="020B0609020204030204" pitchFamily="49" charset="0"/>
+              <a:ea typeface="Source Sans Pro Light" panose="020B0403030403020204" pitchFamily="34" charset="0"/>
+            </a:endParaRPr>
           </a:p>
           <a:p>
             <a:pPr marL="0" indent="0">
@@ -9871,14 +9813,14 @@
                 <a:latin typeface="Consolas" panose="020B0609020204030204" pitchFamily="49" charset="0"/>
                 <a:ea typeface="Source Sans Pro Light" panose="020B0403030403020204" pitchFamily="34" charset="0"/>
               </a:rPr>
-              <a:t>conditionN</a:t>
+              <a:t>condition2</a:t>
             </a:r>
             <a:r>
               <a:rPr lang="en-US" sz="1600" dirty="0">
                 <a:latin typeface="Consolas" panose="020B0609020204030204" pitchFamily="49" charset="0"/>
                 <a:ea typeface="Source Sans Pro Light" panose="020B0403030403020204" pitchFamily="34" charset="0"/>
               </a:rPr>
-              <a:t>-1)</a:t>
+              <a:t>)</a:t>
             </a:r>
           </a:p>
           <a:p>
@@ -9897,15 +9839,12 @@
                 <a:latin typeface="Consolas" panose="020B0609020204030204" pitchFamily="49" charset="0"/>
                 <a:ea typeface="Source Sans Pro Light" panose="020B0403030403020204" pitchFamily="34" charset="0"/>
               </a:rPr>
-              <a:t>statementN</a:t>
-            </a:r>
-            <a:r>
-              <a:rPr lang="en-US" sz="1600" dirty="0">
-                <a:latin typeface="Consolas" panose="020B0609020204030204" pitchFamily="49" charset="0"/>
-                <a:ea typeface="Source Sans Pro Light" panose="020B0403030403020204" pitchFamily="34" charset="0"/>
-              </a:rPr>
-              <a:t>-1</a:t>
-            </a:r>
+              <a:t>statement2</a:t>
+            </a:r>
+            <a:endParaRPr lang="en-US" sz="1600" dirty="0">
+              <a:latin typeface="Consolas" panose="020B0609020204030204" pitchFamily="49" charset="0"/>
+              <a:ea typeface="Source Sans Pro Light" panose="020B0403030403020204" pitchFamily="34" charset="0"/>
+            </a:endParaRPr>
           </a:p>
           <a:p>
             <a:pPr marL="0" indent="0">
@@ -9967,7 +9906,7 @@
                 <a:latin typeface="Consolas" panose="020B0609020204030204" pitchFamily="49" charset="0"/>
                 <a:ea typeface="Source Sans Pro Light" panose="020B0403030403020204" pitchFamily="34" charset="0"/>
               </a:rPr>
-              <a:t>else</a:t>
+              <a:t>else {</a:t>
             </a:r>
           </a:p>
           <a:p>
@@ -9979,19 +9918,20 @@
                 <a:latin typeface="Consolas" panose="020B0609020204030204" pitchFamily="49" charset="0"/>
                 <a:ea typeface="Source Sans Pro Light" panose="020B0403030403020204" pitchFamily="34" charset="0"/>
               </a:rPr>
-              <a:t>  </a:t>
-            </a:r>
-            <a:r>
-              <a:rPr lang="en-US" sz="1600" dirty="0" err="1">
-                <a:latin typeface="Consolas" panose="020B0609020204030204" pitchFamily="49" charset="0"/>
-                <a:ea typeface="Source Sans Pro Light" panose="020B0403030403020204" pitchFamily="34" charset="0"/>
-              </a:rPr>
-              <a:t>statementN</a:t>
-            </a:r>
-            <a:endParaRPr lang="en-US" sz="1600" dirty="0">
-              <a:latin typeface="Consolas" panose="020B0609020204030204" pitchFamily="49" charset="0"/>
-              <a:ea typeface="Source Sans Pro Light" panose="020B0403030403020204" pitchFamily="34" charset="0"/>
-            </a:endParaRPr>
+              <a:t>  statements</a:t>
+            </a:r>
+          </a:p>
+          <a:p>
+            <a:pPr marL="0" indent="0">
+              <a:buNone/>
+            </a:pPr>
+            <a:r>
+              <a:rPr lang="en-US" sz="1600" dirty="0">
+                <a:latin typeface="Consolas" panose="020B0609020204030204" pitchFamily="49" charset="0"/>
+                <a:ea typeface="Source Sans Pro Light" panose="020B0403030403020204" pitchFamily="34" charset="0"/>
+              </a:rPr>
+              <a:t>}</a:t>
+            </a:r>
           </a:p>
         </p:txBody>
       </p:sp>
@@ -12355,7 +12295,7 @@
                 <a:latin typeface="Source Sans Pro Light" panose="020B0403030403020204" pitchFamily="34" charset="0"/>
                 <a:ea typeface="Source Sans Pro Light" panose="020B0403030403020204" pitchFamily="34" charset="0"/>
               </a:rPr>
-              <a:t>Our goal is to develop an algorithm (define a step-by-step procedure) that uses given inputs to produce desired outputs</a:t>
+              <a:t>Our goal is to develop an algorithm (define a step-by-step procedure) that uses given inputs to produce desired outputs.</a:t>
             </a:r>
             <a:endParaRPr lang="en-US" dirty="0"/>
           </a:p>
@@ -12745,7 +12685,7 @@
                 <a:latin typeface="Source Sans Pro Light" panose="020B0403030403020204" pitchFamily="34" charset="0"/>
                 <a:ea typeface="Source Sans Pro Light" panose="020B0403030403020204" pitchFamily="34" charset="0"/>
               </a:rPr>
-              <a:t> .</a:t>
+              <a:t>.</a:t>
             </a:r>
             <a:endParaRPr lang="en-US" sz="2000" dirty="0">
               <a:latin typeface="Consolas" panose="020B0609020204030204" pitchFamily="49" charset="0"/>

</xml_diff>